<commit_message>
added user delete, fixed minor bugs, updated documentation
</commit_message>
<xml_diff>
--- a/docs/instrukcja.pptx
+++ b/docs/instrukcja.pptx
@@ -12,11 +12,14 @@
     <p:sldId id="261" r:id="rId6"/>
     <p:sldId id="262" r:id="rId7"/>
     <p:sldId id="263" r:id="rId8"/>
-    <p:sldId id="264" r:id="rId9"/>
-    <p:sldId id="265" r:id="rId10"/>
-    <p:sldId id="266" r:id="rId11"/>
-    <p:sldId id="267" r:id="rId12"/>
-    <p:sldId id="268" r:id="rId13"/>
+    <p:sldId id="270" r:id="rId9"/>
+    <p:sldId id="271" r:id="rId10"/>
+    <p:sldId id="264" r:id="rId11"/>
+    <p:sldId id="265" r:id="rId12"/>
+    <p:sldId id="266" r:id="rId13"/>
+    <p:sldId id="267" r:id="rId14"/>
+    <p:sldId id="269" r:id="rId15"/>
+    <p:sldId id="268" r:id="rId16"/>
   </p:sldIdLst>
   <p:sldSz cx="12192000" cy="6858000"/>
   <p:notesSz cx="6858000" cy="9144000"/>
@@ -115,6 +118,11 @@
       </a:defRPr>
     </a:lvl9pPr>
   </p:defaultTextStyle>
+  <p:extLst>
+    <p:ext uri="{EFAFB233-063F-42B5-8137-9DF3F51BA10A}">
+      <p15:sldGuideLst xmlns:p15="http://schemas.microsoft.com/office/powerpoint/2012/main"/>
+    </p:ext>
+  </p:extLst>
 </p:presentation>
 </file>
 
@@ -265,7 +273,7 @@
           <a:p>
             <a:fld id="{14B7DDE9-ACEC-406D-B2FC-2C8C2AAF0E2A}" type="datetimeFigureOut">
               <a:rPr lang="pl-PL" smtClean="0"/>
-              <a:t>17.10.2021</a:t>
+              <a:t>28.10.2021</a:t>
             </a:fld>
             <a:endParaRPr lang="pl-PL"/>
           </a:p>
@@ -463,7 +471,7 @@
           <a:p>
             <a:fld id="{14B7DDE9-ACEC-406D-B2FC-2C8C2AAF0E2A}" type="datetimeFigureOut">
               <a:rPr lang="pl-PL" smtClean="0"/>
-              <a:t>17.10.2021</a:t>
+              <a:t>28.10.2021</a:t>
             </a:fld>
             <a:endParaRPr lang="pl-PL"/>
           </a:p>
@@ -671,7 +679,7 @@
           <a:p>
             <a:fld id="{14B7DDE9-ACEC-406D-B2FC-2C8C2AAF0E2A}" type="datetimeFigureOut">
               <a:rPr lang="pl-PL" smtClean="0"/>
-              <a:t>17.10.2021</a:t>
+              <a:t>28.10.2021</a:t>
             </a:fld>
             <a:endParaRPr lang="pl-PL"/>
           </a:p>
@@ -869,7 +877,7 @@
           <a:p>
             <a:fld id="{14B7DDE9-ACEC-406D-B2FC-2C8C2AAF0E2A}" type="datetimeFigureOut">
               <a:rPr lang="pl-PL" smtClean="0"/>
-              <a:t>17.10.2021</a:t>
+              <a:t>28.10.2021</a:t>
             </a:fld>
             <a:endParaRPr lang="pl-PL"/>
           </a:p>
@@ -1144,7 +1152,7 @@
           <a:p>
             <a:fld id="{14B7DDE9-ACEC-406D-B2FC-2C8C2AAF0E2A}" type="datetimeFigureOut">
               <a:rPr lang="pl-PL" smtClean="0"/>
-              <a:t>17.10.2021</a:t>
+              <a:t>28.10.2021</a:t>
             </a:fld>
             <a:endParaRPr lang="pl-PL"/>
           </a:p>
@@ -1409,7 +1417,7 @@
           <a:p>
             <a:fld id="{14B7DDE9-ACEC-406D-B2FC-2C8C2AAF0E2A}" type="datetimeFigureOut">
               <a:rPr lang="pl-PL" smtClean="0"/>
-              <a:t>17.10.2021</a:t>
+              <a:t>28.10.2021</a:t>
             </a:fld>
             <a:endParaRPr lang="pl-PL"/>
           </a:p>
@@ -1821,7 +1829,7 @@
           <a:p>
             <a:fld id="{14B7DDE9-ACEC-406D-B2FC-2C8C2AAF0E2A}" type="datetimeFigureOut">
               <a:rPr lang="pl-PL" smtClean="0"/>
-              <a:t>17.10.2021</a:t>
+              <a:t>28.10.2021</a:t>
             </a:fld>
             <a:endParaRPr lang="pl-PL"/>
           </a:p>
@@ -1962,7 +1970,7 @@
           <a:p>
             <a:fld id="{14B7DDE9-ACEC-406D-B2FC-2C8C2AAF0E2A}" type="datetimeFigureOut">
               <a:rPr lang="pl-PL" smtClean="0"/>
-              <a:t>17.10.2021</a:t>
+              <a:t>28.10.2021</a:t>
             </a:fld>
             <a:endParaRPr lang="pl-PL"/>
           </a:p>
@@ -2075,7 +2083,7 @@
           <a:p>
             <a:fld id="{14B7DDE9-ACEC-406D-B2FC-2C8C2AAF0E2A}" type="datetimeFigureOut">
               <a:rPr lang="pl-PL" smtClean="0"/>
-              <a:t>17.10.2021</a:t>
+              <a:t>28.10.2021</a:t>
             </a:fld>
             <a:endParaRPr lang="pl-PL"/>
           </a:p>
@@ -2386,7 +2394,7 @@
           <a:p>
             <a:fld id="{14B7DDE9-ACEC-406D-B2FC-2C8C2AAF0E2A}" type="datetimeFigureOut">
               <a:rPr lang="pl-PL" smtClean="0"/>
-              <a:t>17.10.2021</a:t>
+              <a:t>28.10.2021</a:t>
             </a:fld>
             <a:endParaRPr lang="pl-PL"/>
           </a:p>
@@ -2674,7 +2682,7 @@
           <a:p>
             <a:fld id="{14B7DDE9-ACEC-406D-B2FC-2C8C2AAF0E2A}" type="datetimeFigureOut">
               <a:rPr lang="pl-PL" smtClean="0"/>
-              <a:t>17.10.2021</a:t>
+              <a:t>28.10.2021</a:t>
             </a:fld>
             <a:endParaRPr lang="pl-PL"/>
           </a:p>
@@ -2915,7 +2923,7 @@
           <a:p>
             <a:fld id="{14B7DDE9-ACEC-406D-B2FC-2C8C2AAF0E2A}" type="datetimeFigureOut">
               <a:rPr lang="pl-PL" smtClean="0"/>
-              <a:t>17.10.2021</a:t>
+              <a:t>28.10.2021</a:t>
             </a:fld>
             <a:endParaRPr lang="pl-PL"/>
           </a:p>
@@ -3709,7 +3717,7 @@
           <p:cNvPr id="4" name="Obraz 3">
             <a:extLst>
               <a:ext uri="{FF2B5EF4-FFF2-40B4-BE49-F238E27FC236}">
-                <a16:creationId xmlns:a16="http://schemas.microsoft.com/office/drawing/2014/main" id="{9602C24C-0399-4FFA-B129-231704E96FB7}"/>
+                <a16:creationId xmlns:a16="http://schemas.microsoft.com/office/drawing/2014/main" id="{5E99E619-A3B3-422A-8C7A-B064B9A91684}"/>
               </a:ext>
             </a:extLst>
           </p:cNvPr>
@@ -3726,8 +3734,8 @@
         </p:blipFill>
         <p:spPr>
           <a:xfrm>
-            <a:off x="0" y="410401"/>
-            <a:ext cx="12192000" cy="6037196"/>
+            <a:off x="0" y="363188"/>
+            <a:ext cx="12192000" cy="6131994"/>
           </a:xfrm>
           <a:prstGeom prst="rect">
             <a:avLst/>
@@ -3748,8 +3756,8 @@
         </p:nvSpPr>
         <p:spPr>
           <a:xfrm>
-            <a:off x="0" y="410401"/>
-            <a:ext cx="1971413" cy="982172"/>
+            <a:off x="0" y="361419"/>
+            <a:ext cx="1971413" cy="989209"/>
           </a:xfrm>
           <a:prstGeom prst="rect">
             <a:avLst/>
@@ -3800,8 +3808,8 @@
         </p:nvSpPr>
         <p:spPr>
           <a:xfrm>
-            <a:off x="0" y="410401"/>
-            <a:ext cx="12192000" cy="6037195"/>
+            <a:off x="0" y="361419"/>
+            <a:ext cx="12192000" cy="5477319"/>
           </a:xfrm>
           <a:prstGeom prst="rect">
             <a:avLst/>
@@ -3852,8 +3860,8 @@
         </p:nvSpPr>
         <p:spPr>
           <a:xfrm>
-            <a:off x="-1" y="410400"/>
-            <a:ext cx="1971413" cy="6037196"/>
+            <a:off x="-1" y="362818"/>
+            <a:ext cx="1971413" cy="6133762"/>
           </a:xfrm>
           <a:prstGeom prst="rect">
             <a:avLst/>
@@ -4048,20 +4056,72 @@
       </p:sp>
       <p:sp>
         <p:nvSpPr>
-          <p:cNvPr id="13" name="Prostokąt 12">
-            <a:extLst>
-              <a:ext uri="{FF2B5EF4-FFF2-40B4-BE49-F238E27FC236}">
-                <a16:creationId xmlns:a16="http://schemas.microsoft.com/office/drawing/2014/main" id="{8C8A9D5A-E849-4005-A1B5-7AD6400AAC6A}"/>
-              </a:ext>
-            </a:extLst>
-          </p:cNvPr>
-          <p:cNvSpPr/>
-          <p:nvPr/>
-        </p:nvSpPr>
-        <p:spPr>
-          <a:xfrm>
-            <a:off x="1971412" y="1695252"/>
-            <a:ext cx="10220588" cy="3329754"/>
+          <p:cNvPr id="13" name="Owal 12">
+            <a:extLst>
+              <a:ext uri="{FF2B5EF4-FFF2-40B4-BE49-F238E27FC236}">
+                <a16:creationId xmlns:a16="http://schemas.microsoft.com/office/drawing/2014/main" id="{58460A97-B22B-4B2D-A02C-08C333DFB3BA}"/>
+              </a:ext>
+            </a:extLst>
+          </p:cNvPr>
+          <p:cNvSpPr/>
+          <p:nvPr/>
+        </p:nvSpPr>
+        <p:spPr>
+          <a:xfrm>
+            <a:off x="2903987" y="1937669"/>
+            <a:ext cx="402671" cy="360727"/>
+          </a:xfrm>
+          <a:prstGeom prst="ellipse">
+            <a:avLst/>
+          </a:prstGeom>
+          <a:solidFill>
+            <a:srgbClr val="C00000"/>
+          </a:solidFill>
+        </p:spPr>
+        <p:style>
+          <a:lnRef idx="2">
+            <a:schemeClr val="accent2">
+              <a:shade val="50000"/>
+            </a:schemeClr>
+          </a:lnRef>
+          <a:fillRef idx="1">
+            <a:schemeClr val="accent2"/>
+          </a:fillRef>
+          <a:effectRef idx="0">
+            <a:schemeClr val="accent2"/>
+          </a:effectRef>
+          <a:fontRef idx="minor">
+            <a:schemeClr val="lt1"/>
+          </a:fontRef>
+        </p:style>
+        <p:txBody>
+          <a:bodyPr rtlCol="0" anchor="ctr"/>
+          <a:lstStyle/>
+          <a:p>
+            <a:pPr algn="ctr"/>
+            <a:r>
+              <a:rPr lang="pl-PL"/>
+              <a:t>5</a:t>
+            </a:r>
+          </a:p>
+        </p:txBody>
+      </p:sp>
+      <p:sp>
+        <p:nvSpPr>
+          <p:cNvPr id="15" name="Prostokąt 14">
+            <a:extLst>
+              <a:ext uri="{FF2B5EF4-FFF2-40B4-BE49-F238E27FC236}">
+                <a16:creationId xmlns:a16="http://schemas.microsoft.com/office/drawing/2014/main" id="{FEE4E2BC-F7A5-4030-9F0B-357AC8DB550D}"/>
+              </a:ext>
+            </a:extLst>
+          </p:cNvPr>
+          <p:cNvSpPr/>
+          <p:nvPr/>
+        </p:nvSpPr>
+        <p:spPr>
+          <a:xfrm>
+            <a:off x="3205990" y="2034249"/>
+            <a:ext cx="6793687" cy="1992238"/>
           </a:xfrm>
           <a:prstGeom prst="rect">
             <a:avLst/>
@@ -4100,124 +4160,20 @@
       </p:sp>
       <p:sp>
         <p:nvSpPr>
-          <p:cNvPr id="12" name="Owal 11">
-            <a:extLst>
-              <a:ext uri="{FF2B5EF4-FFF2-40B4-BE49-F238E27FC236}">
-                <a16:creationId xmlns:a16="http://schemas.microsoft.com/office/drawing/2014/main" id="{9279B823-E10D-4FA5-A8B5-8E156EC9D0C5}"/>
-              </a:ext>
-            </a:extLst>
-          </p:cNvPr>
-          <p:cNvSpPr/>
-          <p:nvPr/>
-        </p:nvSpPr>
-        <p:spPr>
-          <a:xfrm>
-            <a:off x="2063689" y="1572936"/>
-            <a:ext cx="402671" cy="360727"/>
-          </a:xfrm>
-          <a:prstGeom prst="ellipse">
-            <a:avLst/>
-          </a:prstGeom>
-          <a:solidFill>
-            <a:srgbClr val="C00000"/>
-          </a:solidFill>
-        </p:spPr>
-        <p:style>
-          <a:lnRef idx="2">
-            <a:schemeClr val="accent2">
-              <a:shade val="50000"/>
-            </a:schemeClr>
-          </a:lnRef>
-          <a:fillRef idx="1">
-            <a:schemeClr val="accent2"/>
-          </a:fillRef>
-          <a:effectRef idx="0">
-            <a:schemeClr val="accent2"/>
-          </a:effectRef>
-          <a:fontRef idx="minor">
-            <a:schemeClr val="lt1"/>
-          </a:fontRef>
-        </p:style>
-        <p:txBody>
-          <a:bodyPr rtlCol="0" anchor="ctr"/>
-          <a:lstStyle/>
-          <a:p>
-            <a:pPr algn="ctr"/>
-            <a:r>
-              <a:rPr lang="pl-PL"/>
-              <a:t>4</a:t>
-            </a:r>
-          </a:p>
-        </p:txBody>
-      </p:sp>
-      <p:sp>
-        <p:nvSpPr>
-          <p:cNvPr id="17" name="Owal 16">
-            <a:extLst>
-              <a:ext uri="{FF2B5EF4-FFF2-40B4-BE49-F238E27FC236}">
-                <a16:creationId xmlns:a16="http://schemas.microsoft.com/office/drawing/2014/main" id="{7BC7A504-F030-4A25-A409-171C855F808A}"/>
-              </a:ext>
-            </a:extLst>
-          </p:cNvPr>
-          <p:cNvSpPr/>
-          <p:nvPr/>
-        </p:nvSpPr>
-        <p:spPr>
-          <a:xfrm>
-            <a:off x="4722292" y="3404719"/>
-            <a:ext cx="402671" cy="360727"/>
-          </a:xfrm>
-          <a:prstGeom prst="ellipse">
-            <a:avLst/>
-          </a:prstGeom>
-          <a:solidFill>
-            <a:srgbClr val="C00000"/>
-          </a:solidFill>
-        </p:spPr>
-        <p:style>
-          <a:lnRef idx="2">
-            <a:schemeClr val="accent2">
-              <a:shade val="50000"/>
-            </a:schemeClr>
-          </a:lnRef>
-          <a:fillRef idx="1">
-            <a:schemeClr val="accent2"/>
-          </a:fillRef>
-          <a:effectRef idx="0">
-            <a:schemeClr val="accent2"/>
-          </a:effectRef>
-          <a:fontRef idx="minor">
-            <a:schemeClr val="lt1"/>
-          </a:fontRef>
-        </p:style>
-        <p:txBody>
-          <a:bodyPr rtlCol="0" anchor="ctr"/>
-          <a:lstStyle/>
-          <a:p>
-            <a:pPr algn="ctr"/>
-            <a:r>
-              <a:rPr lang="pl-PL"/>
-              <a:t>8</a:t>
-            </a:r>
-          </a:p>
-        </p:txBody>
-      </p:sp>
-      <p:sp>
-        <p:nvSpPr>
-          <p:cNvPr id="18" name="Prostokąt 17">
-            <a:extLst>
-              <a:ext uri="{FF2B5EF4-FFF2-40B4-BE49-F238E27FC236}">
-                <a16:creationId xmlns:a16="http://schemas.microsoft.com/office/drawing/2014/main" id="{217D489F-2488-4A18-AEF4-65B32E242F84}"/>
-              </a:ext>
-            </a:extLst>
-          </p:cNvPr>
-          <p:cNvSpPr/>
-          <p:nvPr/>
-        </p:nvSpPr>
-        <p:spPr>
-          <a:xfrm>
-            <a:off x="5018009" y="2096258"/>
-            <a:ext cx="3521984" cy="360727"/>
+          <p:cNvPr id="16" name="Prostokąt 15">
+            <a:extLst>
+              <a:ext uri="{FF2B5EF4-FFF2-40B4-BE49-F238E27FC236}">
+                <a16:creationId xmlns:a16="http://schemas.microsoft.com/office/drawing/2014/main" id="{4E515B4F-462C-40B4-881F-DB9110614D34}"/>
+              </a:ext>
+            </a:extLst>
+          </p:cNvPr>
+          <p:cNvSpPr/>
+          <p:nvPr/>
+        </p:nvSpPr>
+        <p:spPr>
+          <a:xfrm>
+            <a:off x="3407325" y="4026486"/>
+            <a:ext cx="6315515" cy="1400115"/>
           </a:xfrm>
           <a:prstGeom prst="rect">
             <a:avLst/>
@@ -4256,20 +4212,72 @@
       </p:sp>
       <p:sp>
         <p:nvSpPr>
-          <p:cNvPr id="19" name="Prostokąt 18">
-            <a:extLst>
-              <a:ext uri="{FF2B5EF4-FFF2-40B4-BE49-F238E27FC236}">
-                <a16:creationId xmlns:a16="http://schemas.microsoft.com/office/drawing/2014/main" id="{F5E46A25-F131-4834-8F55-72854E9905E7}"/>
-              </a:ext>
-            </a:extLst>
-          </p:cNvPr>
-          <p:cNvSpPr/>
-          <p:nvPr/>
-        </p:nvSpPr>
-        <p:spPr>
-          <a:xfrm>
-            <a:off x="4908952" y="2999401"/>
-            <a:ext cx="3521984" cy="429599"/>
+          <p:cNvPr id="14" name="Owal 13">
+            <a:extLst>
+              <a:ext uri="{FF2B5EF4-FFF2-40B4-BE49-F238E27FC236}">
+                <a16:creationId xmlns:a16="http://schemas.microsoft.com/office/drawing/2014/main" id="{59E216A4-7A2E-46B5-90C3-8A16B46CF662}"/>
+              </a:ext>
+            </a:extLst>
+          </p:cNvPr>
+          <p:cNvSpPr/>
+          <p:nvPr/>
+        </p:nvSpPr>
+        <p:spPr>
+          <a:xfrm>
+            <a:off x="3474438" y="4052192"/>
+            <a:ext cx="402671" cy="360727"/>
+          </a:xfrm>
+          <a:prstGeom prst="ellipse">
+            <a:avLst/>
+          </a:prstGeom>
+          <a:solidFill>
+            <a:srgbClr val="C00000"/>
+          </a:solidFill>
+        </p:spPr>
+        <p:style>
+          <a:lnRef idx="2">
+            <a:schemeClr val="accent2">
+              <a:shade val="50000"/>
+            </a:schemeClr>
+          </a:lnRef>
+          <a:fillRef idx="1">
+            <a:schemeClr val="accent2"/>
+          </a:fillRef>
+          <a:effectRef idx="0">
+            <a:schemeClr val="accent2"/>
+          </a:effectRef>
+          <a:fontRef idx="minor">
+            <a:schemeClr val="lt1"/>
+          </a:fontRef>
+        </p:style>
+        <p:txBody>
+          <a:bodyPr rtlCol="0" anchor="ctr"/>
+          <a:lstStyle/>
+          <a:p>
+            <a:pPr algn="ctr"/>
+            <a:r>
+              <a:rPr lang="pl-PL"/>
+              <a:t>6</a:t>
+            </a:r>
+          </a:p>
+        </p:txBody>
+      </p:sp>
+      <p:sp>
+        <p:nvSpPr>
+          <p:cNvPr id="17" name="Prostokąt 16">
+            <a:extLst>
+              <a:ext uri="{FF2B5EF4-FFF2-40B4-BE49-F238E27FC236}">
+                <a16:creationId xmlns:a16="http://schemas.microsoft.com/office/drawing/2014/main" id="{1300A9F9-1CB4-4F1F-A185-7F2165B4361C}"/>
+              </a:ext>
+            </a:extLst>
+          </p:cNvPr>
+          <p:cNvSpPr/>
+          <p:nvPr/>
+        </p:nvSpPr>
+        <p:spPr>
+          <a:xfrm>
+            <a:off x="2125208" y="1546140"/>
+            <a:ext cx="8293919" cy="4292597"/>
           </a:xfrm>
           <a:prstGeom prst="rect">
             <a:avLst/>
@@ -4308,71 +4316,19 @@
       </p:sp>
       <p:sp>
         <p:nvSpPr>
-          <p:cNvPr id="20" name="Prostokąt 19">
-            <a:extLst>
-              <a:ext uri="{FF2B5EF4-FFF2-40B4-BE49-F238E27FC236}">
-                <a16:creationId xmlns:a16="http://schemas.microsoft.com/office/drawing/2014/main" id="{949503EB-3B83-46E3-B856-C880FD24270B}"/>
-              </a:ext>
-            </a:extLst>
-          </p:cNvPr>
-          <p:cNvSpPr/>
-          <p:nvPr/>
-        </p:nvSpPr>
-        <p:spPr>
-          <a:xfrm>
-            <a:off x="8976220" y="2039584"/>
-            <a:ext cx="3095538" cy="959817"/>
-          </a:xfrm>
-          <a:prstGeom prst="rect">
-            <a:avLst/>
-          </a:prstGeom>
-          <a:noFill/>
-          <a:ln w="38100">
-            <a:solidFill>
-              <a:srgbClr val="C00000"/>
-            </a:solidFill>
-          </a:ln>
-        </p:spPr>
-        <p:style>
-          <a:lnRef idx="2">
-            <a:schemeClr val="accent1">
-              <a:shade val="50000"/>
-            </a:schemeClr>
-          </a:lnRef>
-          <a:fillRef idx="1">
-            <a:schemeClr val="accent1"/>
-          </a:fillRef>
-          <a:effectRef idx="0">
-            <a:schemeClr val="accent1"/>
-          </a:effectRef>
-          <a:fontRef idx="minor">
-            <a:schemeClr val="lt1"/>
-          </a:fontRef>
-        </p:style>
-        <p:txBody>
-          <a:bodyPr rtlCol="0" anchor="ctr"/>
-          <a:lstStyle/>
-          <a:p>
-            <a:pPr algn="ctr"/>
-            <a:endParaRPr lang="pl-PL"/>
-          </a:p>
-        </p:txBody>
-      </p:sp>
-      <p:sp>
-        <p:nvSpPr>
-          <p:cNvPr id="14" name="Owal 13">
-            <a:extLst>
-              <a:ext uri="{FF2B5EF4-FFF2-40B4-BE49-F238E27FC236}">
-                <a16:creationId xmlns:a16="http://schemas.microsoft.com/office/drawing/2014/main" id="{774BDCA0-C025-4322-9D8C-0C72897EC2C1}"/>
-              </a:ext>
-            </a:extLst>
-          </p:cNvPr>
-          <p:cNvSpPr/>
-          <p:nvPr/>
-        </p:nvSpPr>
-        <p:spPr>
-          <a:xfrm>
-            <a:off x="4722292" y="1785646"/>
+          <p:cNvPr id="12" name="Owal 11">
+            <a:extLst>
+              <a:ext uri="{FF2B5EF4-FFF2-40B4-BE49-F238E27FC236}">
+                <a16:creationId xmlns:a16="http://schemas.microsoft.com/office/drawing/2014/main" id="{D608EC4F-3B04-4AE3-A547-F27CEF9F2B70}"/>
+              </a:ext>
+            </a:extLst>
+          </p:cNvPr>
+          <p:cNvSpPr/>
+          <p:nvPr/>
+        </p:nvSpPr>
+        <p:spPr>
+          <a:xfrm>
+            <a:off x="2125208" y="1364892"/>
             <a:ext cx="402671" cy="360727"/>
           </a:xfrm>
           <a:prstGeom prst="ellipse">
@@ -4405,111 +4361,7 @@
             <a:pPr algn="ctr"/>
             <a:r>
               <a:rPr lang="pl-PL"/>
-              <a:t>5</a:t>
-            </a:r>
-          </a:p>
-        </p:txBody>
-      </p:sp>
-      <p:sp>
-        <p:nvSpPr>
-          <p:cNvPr id="15" name="Owal 14">
-            <a:extLst>
-              <a:ext uri="{FF2B5EF4-FFF2-40B4-BE49-F238E27FC236}">
-                <a16:creationId xmlns:a16="http://schemas.microsoft.com/office/drawing/2014/main" id="{05CD3EEE-CA10-41F2-AF6A-ADF551A85D76}"/>
-              </a:ext>
-            </a:extLst>
-          </p:cNvPr>
-          <p:cNvSpPr/>
-          <p:nvPr/>
-        </p:nvSpPr>
-        <p:spPr>
-          <a:xfrm>
-            <a:off x="4722292" y="2690607"/>
-            <a:ext cx="402671" cy="360727"/>
-          </a:xfrm>
-          <a:prstGeom prst="ellipse">
-            <a:avLst/>
-          </a:prstGeom>
-          <a:solidFill>
-            <a:srgbClr val="C00000"/>
-          </a:solidFill>
-        </p:spPr>
-        <p:style>
-          <a:lnRef idx="2">
-            <a:schemeClr val="accent2">
-              <a:shade val="50000"/>
-            </a:schemeClr>
-          </a:lnRef>
-          <a:fillRef idx="1">
-            <a:schemeClr val="accent2"/>
-          </a:fillRef>
-          <a:effectRef idx="0">
-            <a:schemeClr val="accent2"/>
-          </a:effectRef>
-          <a:fontRef idx="minor">
-            <a:schemeClr val="lt1"/>
-          </a:fontRef>
-        </p:style>
-        <p:txBody>
-          <a:bodyPr rtlCol="0" anchor="ctr"/>
-          <a:lstStyle/>
-          <a:p>
-            <a:pPr algn="ctr"/>
-            <a:r>
-              <a:rPr lang="pl-PL"/>
-              <a:t>6</a:t>
-            </a:r>
-          </a:p>
-        </p:txBody>
-      </p:sp>
-      <p:sp>
-        <p:nvSpPr>
-          <p:cNvPr id="16" name="Owal 15">
-            <a:extLst>
-              <a:ext uri="{FF2B5EF4-FFF2-40B4-BE49-F238E27FC236}">
-                <a16:creationId xmlns:a16="http://schemas.microsoft.com/office/drawing/2014/main" id="{C27A5AE7-0814-43FC-97C5-B2C0789C1457}"/>
-              </a:ext>
-            </a:extLst>
-          </p:cNvPr>
-          <p:cNvSpPr/>
-          <p:nvPr/>
-        </p:nvSpPr>
-        <p:spPr>
-          <a:xfrm>
-            <a:off x="8749718" y="1786855"/>
-            <a:ext cx="402671" cy="360727"/>
-          </a:xfrm>
-          <a:prstGeom prst="ellipse">
-            <a:avLst/>
-          </a:prstGeom>
-          <a:solidFill>
-            <a:srgbClr val="C00000"/>
-          </a:solidFill>
-        </p:spPr>
-        <p:style>
-          <a:lnRef idx="2">
-            <a:schemeClr val="accent2">
-              <a:shade val="50000"/>
-            </a:schemeClr>
-          </a:lnRef>
-          <a:fillRef idx="1">
-            <a:schemeClr val="accent2"/>
-          </a:fillRef>
-          <a:effectRef idx="0">
-            <a:schemeClr val="accent2"/>
-          </a:effectRef>
-          <a:fontRef idx="minor">
-            <a:schemeClr val="lt1"/>
-          </a:fontRef>
-        </p:style>
-        <p:txBody>
-          <a:bodyPr rtlCol="0" anchor="ctr"/>
-          <a:lstStyle/>
-          <a:p>
-            <a:pPr algn="ctr"/>
-            <a:r>
-              <a:rPr lang="pl-PL"/>
-              <a:t>7</a:t>
+              <a:t>4</a:t>
             </a:r>
           </a:p>
         </p:txBody>
@@ -4517,7 +4369,7 @@
     </p:spTree>
     <p:extLst>
       <p:ext uri="{BB962C8B-B14F-4D97-AF65-F5344CB8AC3E}">
-        <p14:creationId xmlns:p14="http://schemas.microsoft.com/office/powerpoint/2010/main" val="1430500107"/>
+        <p14:creationId xmlns:p14="http://schemas.microsoft.com/office/powerpoint/2010/main" val="3809811575"/>
       </p:ext>
     </p:extLst>
   </p:cSld>
@@ -4549,7 +4401,7 @@
           <p:cNvPr id="4" name="Obraz 3">
             <a:extLst>
               <a:ext uri="{FF2B5EF4-FFF2-40B4-BE49-F238E27FC236}">
-                <a16:creationId xmlns:a16="http://schemas.microsoft.com/office/drawing/2014/main" id="{770FE086-2EBF-4388-B4F4-9815B67B3019}"/>
+                <a16:creationId xmlns:a16="http://schemas.microsoft.com/office/drawing/2014/main" id="{E721BC4A-F3DE-43F2-B8F3-1F36CF1762D8}"/>
               </a:ext>
             </a:extLst>
           </p:cNvPr>
@@ -4566,8 +4418,8 @@
         </p:blipFill>
         <p:spPr>
           <a:xfrm>
-            <a:off x="0" y="363188"/>
-            <a:ext cx="12192000" cy="6131994"/>
+            <a:off x="0" y="361419"/>
+            <a:ext cx="12192000" cy="6135203"/>
           </a:xfrm>
           <a:prstGeom prst="rect">
             <a:avLst/>
@@ -4900,7 +4752,7 @@
         </p:nvSpPr>
         <p:spPr>
           <a:xfrm>
-            <a:off x="10489035" y="675658"/>
+            <a:off x="4452454" y="775280"/>
             <a:ext cx="402671" cy="360727"/>
           </a:xfrm>
           <a:prstGeom prst="ellipse">
@@ -4940,19 +4792,71 @@
       </p:sp>
       <p:sp>
         <p:nvSpPr>
-          <p:cNvPr id="13" name="Owal 12">
-            <a:extLst>
-              <a:ext uri="{FF2B5EF4-FFF2-40B4-BE49-F238E27FC236}">
-                <a16:creationId xmlns:a16="http://schemas.microsoft.com/office/drawing/2014/main" id="{D45DF03F-F915-4A56-A693-33B93226676C}"/>
-              </a:ext>
-            </a:extLst>
-          </p:cNvPr>
-          <p:cNvSpPr/>
-          <p:nvPr/>
-        </p:nvSpPr>
-        <p:spPr>
-          <a:xfrm>
-            <a:off x="2041319" y="2480689"/>
+          <p:cNvPr id="13" name="Prostokąt 12">
+            <a:extLst>
+              <a:ext uri="{FF2B5EF4-FFF2-40B4-BE49-F238E27FC236}">
+                <a16:creationId xmlns:a16="http://schemas.microsoft.com/office/drawing/2014/main" id="{99AD6B7C-45DA-4658-A1B9-D8315DE4CDCE}"/>
+              </a:ext>
+            </a:extLst>
+          </p:cNvPr>
+          <p:cNvSpPr/>
+          <p:nvPr/>
+        </p:nvSpPr>
+        <p:spPr>
+          <a:xfrm>
+            <a:off x="-1" y="361419"/>
+            <a:ext cx="12192001" cy="3648519"/>
+          </a:xfrm>
+          <a:prstGeom prst="rect">
+            <a:avLst/>
+          </a:prstGeom>
+          <a:noFill/>
+          <a:ln w="38100">
+            <a:solidFill>
+              <a:srgbClr val="C00000"/>
+            </a:solidFill>
+          </a:ln>
+        </p:spPr>
+        <p:style>
+          <a:lnRef idx="2">
+            <a:schemeClr val="accent1">
+              <a:shade val="50000"/>
+            </a:schemeClr>
+          </a:lnRef>
+          <a:fillRef idx="1">
+            <a:schemeClr val="accent1"/>
+          </a:fillRef>
+          <a:effectRef idx="0">
+            <a:schemeClr val="accent1"/>
+          </a:effectRef>
+          <a:fontRef idx="minor">
+            <a:schemeClr val="lt1"/>
+          </a:fontRef>
+        </p:style>
+        <p:txBody>
+          <a:bodyPr rtlCol="0" anchor="ctr"/>
+          <a:lstStyle/>
+          <a:p>
+            <a:pPr algn="ctr"/>
+            <a:endParaRPr lang="pl-PL"/>
+          </a:p>
+        </p:txBody>
+      </p:sp>
+      <p:sp>
+        <p:nvSpPr>
+          <p:cNvPr id="16" name="Owal 15">
+            <a:extLst>
+              <a:ext uri="{FF2B5EF4-FFF2-40B4-BE49-F238E27FC236}">
+                <a16:creationId xmlns:a16="http://schemas.microsoft.com/office/drawing/2014/main" id="{078ED556-A047-4BF7-B661-A597A30A1199}"/>
+              </a:ext>
+            </a:extLst>
+          </p:cNvPr>
+          <p:cNvSpPr/>
+          <p:nvPr/>
+        </p:nvSpPr>
+        <p:spPr>
+          <a:xfrm>
+            <a:off x="10322650" y="545284"/>
             <a:ext cx="402671" cy="360727"/>
           </a:xfrm>
           <a:prstGeom prst="ellipse">
@@ -4985,8 +4889,164 @@
             <a:pPr algn="ctr"/>
             <a:r>
               <a:rPr lang="pl-PL"/>
-              <a:t>5</a:t>
-            </a:r>
+              <a:t>7</a:t>
+            </a:r>
+          </a:p>
+        </p:txBody>
+      </p:sp>
+      <p:sp>
+        <p:nvSpPr>
+          <p:cNvPr id="17" name="Prostokąt 16">
+            <a:extLst>
+              <a:ext uri="{FF2B5EF4-FFF2-40B4-BE49-F238E27FC236}">
+                <a16:creationId xmlns:a16="http://schemas.microsoft.com/office/drawing/2014/main" id="{2A4BAB5F-3595-49F8-8E5A-4CCA66695EFD}"/>
+              </a:ext>
+            </a:extLst>
+          </p:cNvPr>
+          <p:cNvSpPr/>
+          <p:nvPr/>
+        </p:nvSpPr>
+        <p:spPr>
+          <a:xfrm>
+            <a:off x="4676859" y="1078331"/>
+            <a:ext cx="4601365" cy="360727"/>
+          </a:xfrm>
+          <a:prstGeom prst="rect">
+            <a:avLst/>
+          </a:prstGeom>
+          <a:noFill/>
+          <a:ln w="38100">
+            <a:solidFill>
+              <a:srgbClr val="C00000"/>
+            </a:solidFill>
+          </a:ln>
+        </p:spPr>
+        <p:style>
+          <a:lnRef idx="2">
+            <a:schemeClr val="accent1">
+              <a:shade val="50000"/>
+            </a:schemeClr>
+          </a:lnRef>
+          <a:fillRef idx="1">
+            <a:schemeClr val="accent1"/>
+          </a:fillRef>
+          <a:effectRef idx="0">
+            <a:schemeClr val="accent1"/>
+          </a:effectRef>
+          <a:fontRef idx="minor">
+            <a:schemeClr val="lt1"/>
+          </a:fontRef>
+        </p:style>
+        <p:txBody>
+          <a:bodyPr rtlCol="0" anchor="ctr"/>
+          <a:lstStyle/>
+          <a:p>
+            <a:pPr algn="ctr"/>
+            <a:endParaRPr lang="pl-PL"/>
+          </a:p>
+        </p:txBody>
+      </p:sp>
+      <p:sp>
+        <p:nvSpPr>
+          <p:cNvPr id="18" name="Prostokąt 17">
+            <a:extLst>
+              <a:ext uri="{FF2B5EF4-FFF2-40B4-BE49-F238E27FC236}">
+                <a16:creationId xmlns:a16="http://schemas.microsoft.com/office/drawing/2014/main" id="{ADE7A393-36FF-49CA-8216-F560AF991C23}"/>
+              </a:ext>
+            </a:extLst>
+          </p:cNvPr>
+          <p:cNvSpPr/>
+          <p:nvPr/>
+        </p:nvSpPr>
+        <p:spPr>
+          <a:xfrm>
+            <a:off x="4676859" y="1875987"/>
+            <a:ext cx="4601365" cy="959492"/>
+          </a:xfrm>
+          <a:prstGeom prst="rect">
+            <a:avLst/>
+          </a:prstGeom>
+          <a:noFill/>
+          <a:ln w="38100">
+            <a:solidFill>
+              <a:srgbClr val="C00000"/>
+            </a:solidFill>
+          </a:ln>
+        </p:spPr>
+        <p:style>
+          <a:lnRef idx="2">
+            <a:schemeClr val="accent1">
+              <a:shade val="50000"/>
+            </a:schemeClr>
+          </a:lnRef>
+          <a:fillRef idx="1">
+            <a:schemeClr val="accent1"/>
+          </a:fillRef>
+          <a:effectRef idx="0">
+            <a:schemeClr val="accent1"/>
+          </a:effectRef>
+          <a:fontRef idx="minor">
+            <a:schemeClr val="lt1"/>
+          </a:fontRef>
+        </p:style>
+        <p:txBody>
+          <a:bodyPr rtlCol="0" anchor="ctr"/>
+          <a:lstStyle/>
+          <a:p>
+            <a:pPr algn="ctr"/>
+            <a:endParaRPr lang="pl-PL"/>
+          </a:p>
+        </p:txBody>
+      </p:sp>
+      <p:sp>
+        <p:nvSpPr>
+          <p:cNvPr id="19" name="Prostokąt 18">
+            <a:extLst>
+              <a:ext uri="{FF2B5EF4-FFF2-40B4-BE49-F238E27FC236}">
+                <a16:creationId xmlns:a16="http://schemas.microsoft.com/office/drawing/2014/main" id="{2553C09D-F4F4-4344-850D-1126FADC38C0}"/>
+              </a:ext>
+            </a:extLst>
+          </p:cNvPr>
+          <p:cNvSpPr/>
+          <p:nvPr/>
+        </p:nvSpPr>
+        <p:spPr>
+          <a:xfrm>
+            <a:off x="4676859" y="2958166"/>
+            <a:ext cx="1419141" cy="360727"/>
+          </a:xfrm>
+          <a:prstGeom prst="rect">
+            <a:avLst/>
+          </a:prstGeom>
+          <a:noFill/>
+          <a:ln w="38100">
+            <a:solidFill>
+              <a:srgbClr val="C00000"/>
+            </a:solidFill>
+          </a:ln>
+        </p:spPr>
+        <p:style>
+          <a:lnRef idx="2">
+            <a:schemeClr val="accent1">
+              <a:shade val="50000"/>
+            </a:schemeClr>
+          </a:lnRef>
+          <a:fillRef idx="1">
+            <a:schemeClr val="accent1"/>
+          </a:fillRef>
+          <a:effectRef idx="0">
+            <a:schemeClr val="accent1"/>
+          </a:effectRef>
+          <a:fontRef idx="minor">
+            <a:schemeClr val="lt1"/>
+          </a:fontRef>
+        </p:style>
+        <p:txBody>
+          <a:bodyPr rtlCol="0" anchor="ctr"/>
+          <a:lstStyle/>
+          <a:p>
+            <a:pPr algn="ctr"/>
+            <a:endParaRPr lang="pl-PL"/>
           </a:p>
         </p:txBody>
       </p:sp>
@@ -4995,16 +5055,16 @@
           <p:cNvPr id="14" name="Owal 13">
             <a:extLst>
               <a:ext uri="{FF2B5EF4-FFF2-40B4-BE49-F238E27FC236}">
-                <a16:creationId xmlns:a16="http://schemas.microsoft.com/office/drawing/2014/main" id="{A6C0C84E-1BF8-40B7-8601-1592B2F2F0BF}"/>
-              </a:ext>
-            </a:extLst>
-          </p:cNvPr>
-          <p:cNvSpPr/>
-          <p:nvPr/>
-        </p:nvSpPr>
-        <p:spPr>
-          <a:xfrm>
-            <a:off x="5557705" y="2480689"/>
+                <a16:creationId xmlns:a16="http://schemas.microsoft.com/office/drawing/2014/main" id="{C0659EC7-B116-4D0B-B473-A76E24D0CA69}"/>
+              </a:ext>
+            </a:extLst>
+          </p:cNvPr>
+          <p:cNvSpPr/>
+          <p:nvPr/>
+        </p:nvSpPr>
+        <p:spPr>
+          <a:xfrm>
+            <a:off x="4462942" y="1580969"/>
             <a:ext cx="402671" cy="360727"/>
           </a:xfrm>
           <a:prstGeom prst="ellipse">
@@ -5037,7 +5097,1427 @@
             <a:pPr algn="ctr"/>
             <a:r>
               <a:rPr lang="pl-PL"/>
+              <a:t>5</a:t>
+            </a:r>
+          </a:p>
+        </p:txBody>
+      </p:sp>
+      <p:sp>
+        <p:nvSpPr>
+          <p:cNvPr id="15" name="Owal 14">
+            <a:extLst>
+              <a:ext uri="{FF2B5EF4-FFF2-40B4-BE49-F238E27FC236}">
+                <a16:creationId xmlns:a16="http://schemas.microsoft.com/office/drawing/2014/main" id="{C985A0CB-847D-4F1F-9BE6-D39F83926123}"/>
+              </a:ext>
+            </a:extLst>
+          </p:cNvPr>
+          <p:cNvSpPr/>
+          <p:nvPr/>
+        </p:nvSpPr>
+        <p:spPr>
+          <a:xfrm>
+            <a:off x="4452453" y="2716459"/>
+            <a:ext cx="402671" cy="360727"/>
+          </a:xfrm>
+          <a:prstGeom prst="ellipse">
+            <a:avLst/>
+          </a:prstGeom>
+          <a:solidFill>
+            <a:srgbClr val="C00000"/>
+          </a:solidFill>
+        </p:spPr>
+        <p:style>
+          <a:lnRef idx="2">
+            <a:schemeClr val="accent2">
+              <a:shade val="50000"/>
+            </a:schemeClr>
+          </a:lnRef>
+          <a:fillRef idx="1">
+            <a:schemeClr val="accent2"/>
+          </a:fillRef>
+          <a:effectRef idx="0">
+            <a:schemeClr val="accent2"/>
+          </a:effectRef>
+          <a:fontRef idx="minor">
+            <a:schemeClr val="lt1"/>
+          </a:fontRef>
+        </p:style>
+        <p:txBody>
+          <a:bodyPr rtlCol="0" anchor="ctr"/>
+          <a:lstStyle/>
+          <a:p>
+            <a:pPr algn="ctr"/>
+            <a:r>
+              <a:rPr lang="pl-PL"/>
               <a:t>6</a:t>
+            </a:r>
+          </a:p>
+        </p:txBody>
+      </p:sp>
+      <p:sp>
+        <p:nvSpPr>
+          <p:cNvPr id="20" name="Prostokąt 19">
+            <a:extLst>
+              <a:ext uri="{FF2B5EF4-FFF2-40B4-BE49-F238E27FC236}">
+                <a16:creationId xmlns:a16="http://schemas.microsoft.com/office/drawing/2014/main" id="{870EA9D1-DAB9-4FD9-A588-562015EC9DD8}"/>
+              </a:ext>
+            </a:extLst>
+          </p:cNvPr>
+          <p:cNvSpPr/>
+          <p:nvPr/>
+        </p:nvSpPr>
+        <p:spPr>
+          <a:xfrm>
+            <a:off x="10577119" y="752379"/>
+            <a:ext cx="1360412" cy="959492"/>
+          </a:xfrm>
+          <a:prstGeom prst="rect">
+            <a:avLst/>
+          </a:prstGeom>
+          <a:noFill/>
+          <a:ln w="38100">
+            <a:solidFill>
+              <a:srgbClr val="C00000"/>
+            </a:solidFill>
+          </a:ln>
+        </p:spPr>
+        <p:style>
+          <a:lnRef idx="2">
+            <a:schemeClr val="accent1">
+              <a:shade val="50000"/>
+            </a:schemeClr>
+          </a:lnRef>
+          <a:fillRef idx="1">
+            <a:schemeClr val="accent1"/>
+          </a:fillRef>
+          <a:effectRef idx="0">
+            <a:schemeClr val="accent1"/>
+          </a:effectRef>
+          <a:fontRef idx="minor">
+            <a:schemeClr val="lt1"/>
+          </a:fontRef>
+        </p:style>
+        <p:txBody>
+          <a:bodyPr rtlCol="0" anchor="ctr"/>
+          <a:lstStyle/>
+          <a:p>
+            <a:pPr algn="ctr"/>
+            <a:endParaRPr lang="pl-PL"/>
+          </a:p>
+        </p:txBody>
+      </p:sp>
+    </p:spTree>
+    <p:extLst>
+      <p:ext uri="{BB962C8B-B14F-4D97-AF65-F5344CB8AC3E}">
+        <p14:creationId xmlns:p14="http://schemas.microsoft.com/office/powerpoint/2010/main" val="2296116465"/>
+      </p:ext>
+    </p:extLst>
+  </p:cSld>
+  <p:clrMapOvr>
+    <a:masterClrMapping/>
+  </p:clrMapOvr>
+</p:sld>
+</file>
+
+<file path=ppt/slides/slide12.xml><?xml version="1.0" encoding="utf-8"?>
+<p:sld xmlns:a="http://schemas.openxmlformats.org/drawingml/2006/main" xmlns:r="http://schemas.openxmlformats.org/officeDocument/2006/relationships" xmlns:p="http://schemas.openxmlformats.org/presentationml/2006/main">
+  <p:cSld>
+    <p:spTree>
+      <p:nvGrpSpPr>
+        <p:cNvPr id="1" name=""/>
+        <p:cNvGrpSpPr/>
+        <p:nvPr/>
+      </p:nvGrpSpPr>
+      <p:grpSpPr>
+        <a:xfrm>
+          <a:off x="0" y="0"/>
+          <a:ext cx="0" cy="0"/>
+          <a:chOff x="0" y="0"/>
+          <a:chExt cx="0" cy="0"/>
+        </a:xfrm>
+      </p:grpSpPr>
+      <p:pic>
+        <p:nvPicPr>
+          <p:cNvPr id="4" name="Obraz 3">
+            <a:extLst>
+              <a:ext uri="{FF2B5EF4-FFF2-40B4-BE49-F238E27FC236}">
+                <a16:creationId xmlns:a16="http://schemas.microsoft.com/office/drawing/2014/main" id="{9602C24C-0399-4FFA-B129-231704E96FB7}"/>
+              </a:ext>
+            </a:extLst>
+          </p:cNvPr>
+          <p:cNvPicPr>
+            <a:picLocks noChangeAspect="1"/>
+          </p:cNvPicPr>
+          <p:nvPr/>
+        </p:nvPicPr>
+        <p:blipFill>
+          <a:blip r:embed="rId2"/>
+          <a:stretch>
+            <a:fillRect/>
+          </a:stretch>
+        </p:blipFill>
+        <p:spPr>
+          <a:xfrm>
+            <a:off x="0" y="410401"/>
+            <a:ext cx="12192000" cy="6037196"/>
+          </a:xfrm>
+          <a:prstGeom prst="rect">
+            <a:avLst/>
+          </a:prstGeom>
+        </p:spPr>
+      </p:pic>
+      <p:sp>
+        <p:nvSpPr>
+          <p:cNvPr id="6" name="Prostokąt 5">
+            <a:extLst>
+              <a:ext uri="{FF2B5EF4-FFF2-40B4-BE49-F238E27FC236}">
+                <a16:creationId xmlns:a16="http://schemas.microsoft.com/office/drawing/2014/main" id="{16F0A95E-C46C-4106-8609-493577FD511F}"/>
+              </a:ext>
+            </a:extLst>
+          </p:cNvPr>
+          <p:cNvSpPr/>
+          <p:nvPr/>
+        </p:nvSpPr>
+        <p:spPr>
+          <a:xfrm>
+            <a:off x="0" y="410401"/>
+            <a:ext cx="1971413" cy="982172"/>
+          </a:xfrm>
+          <a:prstGeom prst="rect">
+            <a:avLst/>
+          </a:prstGeom>
+          <a:noFill/>
+          <a:ln w="38100">
+            <a:solidFill>
+              <a:srgbClr val="C00000"/>
+            </a:solidFill>
+          </a:ln>
+        </p:spPr>
+        <p:style>
+          <a:lnRef idx="2">
+            <a:schemeClr val="accent1">
+              <a:shade val="50000"/>
+            </a:schemeClr>
+          </a:lnRef>
+          <a:fillRef idx="1">
+            <a:schemeClr val="accent1"/>
+          </a:fillRef>
+          <a:effectRef idx="0">
+            <a:schemeClr val="accent1"/>
+          </a:effectRef>
+          <a:fontRef idx="minor">
+            <a:schemeClr val="lt1"/>
+          </a:fontRef>
+        </p:style>
+        <p:txBody>
+          <a:bodyPr rtlCol="0" anchor="ctr"/>
+          <a:lstStyle/>
+          <a:p>
+            <a:pPr algn="ctr"/>
+            <a:endParaRPr lang="pl-PL"/>
+          </a:p>
+        </p:txBody>
+      </p:sp>
+      <p:sp>
+        <p:nvSpPr>
+          <p:cNvPr id="7" name="Prostokąt 6">
+            <a:extLst>
+              <a:ext uri="{FF2B5EF4-FFF2-40B4-BE49-F238E27FC236}">
+                <a16:creationId xmlns:a16="http://schemas.microsoft.com/office/drawing/2014/main" id="{D024C788-6B8C-4925-A384-D8953E6A7AED}"/>
+              </a:ext>
+            </a:extLst>
+          </p:cNvPr>
+          <p:cNvSpPr/>
+          <p:nvPr/>
+        </p:nvSpPr>
+        <p:spPr>
+          <a:xfrm>
+            <a:off x="0" y="410401"/>
+            <a:ext cx="12192000" cy="6037195"/>
+          </a:xfrm>
+          <a:prstGeom prst="rect">
+            <a:avLst/>
+          </a:prstGeom>
+          <a:noFill/>
+          <a:ln w="38100">
+            <a:solidFill>
+              <a:srgbClr val="C00000"/>
+            </a:solidFill>
+          </a:ln>
+        </p:spPr>
+        <p:style>
+          <a:lnRef idx="2">
+            <a:schemeClr val="accent1">
+              <a:shade val="50000"/>
+            </a:schemeClr>
+          </a:lnRef>
+          <a:fillRef idx="1">
+            <a:schemeClr val="accent1"/>
+          </a:fillRef>
+          <a:effectRef idx="0">
+            <a:schemeClr val="accent1"/>
+          </a:effectRef>
+          <a:fontRef idx="minor">
+            <a:schemeClr val="lt1"/>
+          </a:fontRef>
+        </p:style>
+        <p:txBody>
+          <a:bodyPr rtlCol="0" anchor="ctr"/>
+          <a:lstStyle/>
+          <a:p>
+            <a:pPr algn="ctr"/>
+            <a:endParaRPr lang="pl-PL"/>
+          </a:p>
+        </p:txBody>
+      </p:sp>
+      <p:sp>
+        <p:nvSpPr>
+          <p:cNvPr id="8" name="Prostokąt 7">
+            <a:extLst>
+              <a:ext uri="{FF2B5EF4-FFF2-40B4-BE49-F238E27FC236}">
+                <a16:creationId xmlns:a16="http://schemas.microsoft.com/office/drawing/2014/main" id="{16FB46F9-F620-4AD8-A26F-EA222D2A29FD}"/>
+              </a:ext>
+            </a:extLst>
+          </p:cNvPr>
+          <p:cNvSpPr/>
+          <p:nvPr/>
+        </p:nvSpPr>
+        <p:spPr>
+          <a:xfrm>
+            <a:off x="-1" y="410400"/>
+            <a:ext cx="1971413" cy="6037196"/>
+          </a:xfrm>
+          <a:prstGeom prst="rect">
+            <a:avLst/>
+          </a:prstGeom>
+          <a:noFill/>
+          <a:ln w="38100">
+            <a:solidFill>
+              <a:srgbClr val="C00000"/>
+            </a:solidFill>
+          </a:ln>
+        </p:spPr>
+        <p:style>
+          <a:lnRef idx="2">
+            <a:schemeClr val="accent1">
+              <a:shade val="50000"/>
+            </a:schemeClr>
+          </a:lnRef>
+          <a:fillRef idx="1">
+            <a:schemeClr val="accent1"/>
+          </a:fillRef>
+          <a:effectRef idx="0">
+            <a:schemeClr val="accent1"/>
+          </a:effectRef>
+          <a:fontRef idx="minor">
+            <a:schemeClr val="lt1"/>
+          </a:fontRef>
+        </p:style>
+        <p:txBody>
+          <a:bodyPr rtlCol="0" anchor="ctr"/>
+          <a:lstStyle/>
+          <a:p>
+            <a:pPr algn="ctr"/>
+            <a:endParaRPr lang="pl-PL"/>
+          </a:p>
+        </p:txBody>
+      </p:sp>
+      <p:sp>
+        <p:nvSpPr>
+          <p:cNvPr id="9" name="Owal 8">
+            <a:extLst>
+              <a:ext uri="{FF2B5EF4-FFF2-40B4-BE49-F238E27FC236}">
+                <a16:creationId xmlns:a16="http://schemas.microsoft.com/office/drawing/2014/main" id="{BE4091C0-D10F-4949-B109-0A4051D674E0}"/>
+              </a:ext>
+            </a:extLst>
+          </p:cNvPr>
+          <p:cNvSpPr/>
+          <p:nvPr/>
+        </p:nvSpPr>
+        <p:spPr>
+          <a:xfrm>
+            <a:off x="1300294" y="545284"/>
+            <a:ext cx="402671" cy="360727"/>
+          </a:xfrm>
+          <a:prstGeom prst="ellipse">
+            <a:avLst/>
+          </a:prstGeom>
+          <a:solidFill>
+            <a:srgbClr val="C00000"/>
+          </a:solidFill>
+        </p:spPr>
+        <p:style>
+          <a:lnRef idx="2">
+            <a:schemeClr val="accent2">
+              <a:shade val="50000"/>
+            </a:schemeClr>
+          </a:lnRef>
+          <a:fillRef idx="1">
+            <a:schemeClr val="accent2"/>
+          </a:fillRef>
+          <a:effectRef idx="0">
+            <a:schemeClr val="accent2"/>
+          </a:effectRef>
+          <a:fontRef idx="minor">
+            <a:schemeClr val="lt1"/>
+          </a:fontRef>
+        </p:style>
+        <p:txBody>
+          <a:bodyPr rtlCol="0" anchor="ctr"/>
+          <a:lstStyle/>
+          <a:p>
+            <a:pPr algn="ctr"/>
+            <a:r>
+              <a:rPr lang="pl-PL"/>
+              <a:t>1</a:t>
+            </a:r>
+          </a:p>
+        </p:txBody>
+      </p:sp>
+      <p:sp>
+        <p:nvSpPr>
+          <p:cNvPr id="10" name="Owal 9">
+            <a:extLst>
+              <a:ext uri="{FF2B5EF4-FFF2-40B4-BE49-F238E27FC236}">
+                <a16:creationId xmlns:a16="http://schemas.microsoft.com/office/drawing/2014/main" id="{D8DEDFBA-0286-48C5-AD73-5E1C21954FC6}"/>
+              </a:ext>
+            </a:extLst>
+          </p:cNvPr>
+          <p:cNvSpPr/>
+          <p:nvPr/>
+        </p:nvSpPr>
+        <p:spPr>
+          <a:xfrm>
+            <a:off x="1501629" y="1392573"/>
+            <a:ext cx="402671" cy="360727"/>
+          </a:xfrm>
+          <a:prstGeom prst="ellipse">
+            <a:avLst/>
+          </a:prstGeom>
+          <a:solidFill>
+            <a:srgbClr val="C00000"/>
+          </a:solidFill>
+        </p:spPr>
+        <p:style>
+          <a:lnRef idx="2">
+            <a:schemeClr val="accent2">
+              <a:shade val="50000"/>
+            </a:schemeClr>
+          </a:lnRef>
+          <a:fillRef idx="1">
+            <a:schemeClr val="accent2"/>
+          </a:fillRef>
+          <a:effectRef idx="0">
+            <a:schemeClr val="accent2"/>
+          </a:effectRef>
+          <a:fontRef idx="minor">
+            <a:schemeClr val="lt1"/>
+          </a:fontRef>
+        </p:style>
+        <p:txBody>
+          <a:bodyPr rtlCol="0" anchor="ctr"/>
+          <a:lstStyle/>
+          <a:p>
+            <a:pPr algn="ctr"/>
+            <a:r>
+              <a:rPr lang="pl-PL"/>
+              <a:t>2</a:t>
+            </a:r>
+          </a:p>
+        </p:txBody>
+      </p:sp>
+      <p:sp>
+        <p:nvSpPr>
+          <p:cNvPr id="11" name="Owal 10">
+            <a:extLst>
+              <a:ext uri="{FF2B5EF4-FFF2-40B4-BE49-F238E27FC236}">
+                <a16:creationId xmlns:a16="http://schemas.microsoft.com/office/drawing/2014/main" id="{0E7B7507-53E9-4688-94E1-ED40EF460D70}"/>
+              </a:ext>
+            </a:extLst>
+          </p:cNvPr>
+          <p:cNvSpPr/>
+          <p:nvPr/>
+        </p:nvSpPr>
+        <p:spPr>
+          <a:xfrm>
+            <a:off x="2063690" y="675659"/>
+            <a:ext cx="402671" cy="360727"/>
+          </a:xfrm>
+          <a:prstGeom prst="ellipse">
+            <a:avLst/>
+          </a:prstGeom>
+          <a:solidFill>
+            <a:srgbClr val="C00000"/>
+          </a:solidFill>
+        </p:spPr>
+        <p:style>
+          <a:lnRef idx="2">
+            <a:schemeClr val="accent2">
+              <a:shade val="50000"/>
+            </a:schemeClr>
+          </a:lnRef>
+          <a:fillRef idx="1">
+            <a:schemeClr val="accent2"/>
+          </a:fillRef>
+          <a:effectRef idx="0">
+            <a:schemeClr val="accent2"/>
+          </a:effectRef>
+          <a:fontRef idx="minor">
+            <a:schemeClr val="lt1"/>
+          </a:fontRef>
+        </p:style>
+        <p:txBody>
+          <a:bodyPr rtlCol="0" anchor="ctr"/>
+          <a:lstStyle/>
+          <a:p>
+            <a:pPr algn="ctr"/>
+            <a:r>
+              <a:rPr lang="pl-PL"/>
+              <a:t>3</a:t>
+            </a:r>
+          </a:p>
+        </p:txBody>
+      </p:sp>
+      <p:sp>
+        <p:nvSpPr>
+          <p:cNvPr id="13" name="Prostokąt 12">
+            <a:extLst>
+              <a:ext uri="{FF2B5EF4-FFF2-40B4-BE49-F238E27FC236}">
+                <a16:creationId xmlns:a16="http://schemas.microsoft.com/office/drawing/2014/main" id="{8C8A9D5A-E849-4005-A1B5-7AD6400AAC6A}"/>
+              </a:ext>
+            </a:extLst>
+          </p:cNvPr>
+          <p:cNvSpPr/>
+          <p:nvPr/>
+        </p:nvSpPr>
+        <p:spPr>
+          <a:xfrm>
+            <a:off x="1971412" y="1695252"/>
+            <a:ext cx="10220588" cy="3329754"/>
+          </a:xfrm>
+          <a:prstGeom prst="rect">
+            <a:avLst/>
+          </a:prstGeom>
+          <a:noFill/>
+          <a:ln w="38100">
+            <a:solidFill>
+              <a:srgbClr val="C00000"/>
+            </a:solidFill>
+          </a:ln>
+        </p:spPr>
+        <p:style>
+          <a:lnRef idx="2">
+            <a:schemeClr val="accent1">
+              <a:shade val="50000"/>
+            </a:schemeClr>
+          </a:lnRef>
+          <a:fillRef idx="1">
+            <a:schemeClr val="accent1"/>
+          </a:fillRef>
+          <a:effectRef idx="0">
+            <a:schemeClr val="accent1"/>
+          </a:effectRef>
+          <a:fontRef idx="minor">
+            <a:schemeClr val="lt1"/>
+          </a:fontRef>
+        </p:style>
+        <p:txBody>
+          <a:bodyPr rtlCol="0" anchor="ctr"/>
+          <a:lstStyle/>
+          <a:p>
+            <a:pPr algn="ctr"/>
+            <a:endParaRPr lang="pl-PL"/>
+          </a:p>
+        </p:txBody>
+      </p:sp>
+      <p:sp>
+        <p:nvSpPr>
+          <p:cNvPr id="12" name="Owal 11">
+            <a:extLst>
+              <a:ext uri="{FF2B5EF4-FFF2-40B4-BE49-F238E27FC236}">
+                <a16:creationId xmlns:a16="http://schemas.microsoft.com/office/drawing/2014/main" id="{9279B823-E10D-4FA5-A8B5-8E156EC9D0C5}"/>
+              </a:ext>
+            </a:extLst>
+          </p:cNvPr>
+          <p:cNvSpPr/>
+          <p:nvPr/>
+        </p:nvSpPr>
+        <p:spPr>
+          <a:xfrm>
+            <a:off x="2063689" y="1572936"/>
+            <a:ext cx="402671" cy="360727"/>
+          </a:xfrm>
+          <a:prstGeom prst="ellipse">
+            <a:avLst/>
+          </a:prstGeom>
+          <a:solidFill>
+            <a:srgbClr val="C00000"/>
+          </a:solidFill>
+        </p:spPr>
+        <p:style>
+          <a:lnRef idx="2">
+            <a:schemeClr val="accent2">
+              <a:shade val="50000"/>
+            </a:schemeClr>
+          </a:lnRef>
+          <a:fillRef idx="1">
+            <a:schemeClr val="accent2"/>
+          </a:fillRef>
+          <a:effectRef idx="0">
+            <a:schemeClr val="accent2"/>
+          </a:effectRef>
+          <a:fontRef idx="minor">
+            <a:schemeClr val="lt1"/>
+          </a:fontRef>
+        </p:style>
+        <p:txBody>
+          <a:bodyPr rtlCol="0" anchor="ctr"/>
+          <a:lstStyle/>
+          <a:p>
+            <a:pPr algn="ctr"/>
+            <a:r>
+              <a:rPr lang="pl-PL"/>
+              <a:t>4</a:t>
+            </a:r>
+          </a:p>
+        </p:txBody>
+      </p:sp>
+      <p:sp>
+        <p:nvSpPr>
+          <p:cNvPr id="17" name="Owal 16">
+            <a:extLst>
+              <a:ext uri="{FF2B5EF4-FFF2-40B4-BE49-F238E27FC236}">
+                <a16:creationId xmlns:a16="http://schemas.microsoft.com/office/drawing/2014/main" id="{7BC7A504-F030-4A25-A409-171C855F808A}"/>
+              </a:ext>
+            </a:extLst>
+          </p:cNvPr>
+          <p:cNvSpPr/>
+          <p:nvPr/>
+        </p:nvSpPr>
+        <p:spPr>
+          <a:xfrm>
+            <a:off x="4722292" y="3404719"/>
+            <a:ext cx="402671" cy="360727"/>
+          </a:xfrm>
+          <a:prstGeom prst="ellipse">
+            <a:avLst/>
+          </a:prstGeom>
+          <a:solidFill>
+            <a:srgbClr val="C00000"/>
+          </a:solidFill>
+        </p:spPr>
+        <p:style>
+          <a:lnRef idx="2">
+            <a:schemeClr val="accent2">
+              <a:shade val="50000"/>
+            </a:schemeClr>
+          </a:lnRef>
+          <a:fillRef idx="1">
+            <a:schemeClr val="accent2"/>
+          </a:fillRef>
+          <a:effectRef idx="0">
+            <a:schemeClr val="accent2"/>
+          </a:effectRef>
+          <a:fontRef idx="minor">
+            <a:schemeClr val="lt1"/>
+          </a:fontRef>
+        </p:style>
+        <p:txBody>
+          <a:bodyPr rtlCol="0" anchor="ctr"/>
+          <a:lstStyle/>
+          <a:p>
+            <a:pPr algn="ctr"/>
+            <a:r>
+              <a:rPr lang="pl-PL"/>
+              <a:t>8</a:t>
+            </a:r>
+          </a:p>
+        </p:txBody>
+      </p:sp>
+      <p:sp>
+        <p:nvSpPr>
+          <p:cNvPr id="18" name="Prostokąt 17">
+            <a:extLst>
+              <a:ext uri="{FF2B5EF4-FFF2-40B4-BE49-F238E27FC236}">
+                <a16:creationId xmlns:a16="http://schemas.microsoft.com/office/drawing/2014/main" id="{217D489F-2488-4A18-AEF4-65B32E242F84}"/>
+              </a:ext>
+            </a:extLst>
+          </p:cNvPr>
+          <p:cNvSpPr/>
+          <p:nvPr/>
+        </p:nvSpPr>
+        <p:spPr>
+          <a:xfrm>
+            <a:off x="5018009" y="2096258"/>
+            <a:ext cx="3521984" cy="360727"/>
+          </a:xfrm>
+          <a:prstGeom prst="rect">
+            <a:avLst/>
+          </a:prstGeom>
+          <a:noFill/>
+          <a:ln w="38100">
+            <a:solidFill>
+              <a:srgbClr val="C00000"/>
+            </a:solidFill>
+          </a:ln>
+        </p:spPr>
+        <p:style>
+          <a:lnRef idx="2">
+            <a:schemeClr val="accent1">
+              <a:shade val="50000"/>
+            </a:schemeClr>
+          </a:lnRef>
+          <a:fillRef idx="1">
+            <a:schemeClr val="accent1"/>
+          </a:fillRef>
+          <a:effectRef idx="0">
+            <a:schemeClr val="accent1"/>
+          </a:effectRef>
+          <a:fontRef idx="minor">
+            <a:schemeClr val="lt1"/>
+          </a:fontRef>
+        </p:style>
+        <p:txBody>
+          <a:bodyPr rtlCol="0" anchor="ctr"/>
+          <a:lstStyle/>
+          <a:p>
+            <a:pPr algn="ctr"/>
+            <a:endParaRPr lang="pl-PL"/>
+          </a:p>
+        </p:txBody>
+      </p:sp>
+      <p:sp>
+        <p:nvSpPr>
+          <p:cNvPr id="19" name="Prostokąt 18">
+            <a:extLst>
+              <a:ext uri="{FF2B5EF4-FFF2-40B4-BE49-F238E27FC236}">
+                <a16:creationId xmlns:a16="http://schemas.microsoft.com/office/drawing/2014/main" id="{F5E46A25-F131-4834-8F55-72854E9905E7}"/>
+              </a:ext>
+            </a:extLst>
+          </p:cNvPr>
+          <p:cNvSpPr/>
+          <p:nvPr/>
+        </p:nvSpPr>
+        <p:spPr>
+          <a:xfrm>
+            <a:off x="4908952" y="2999401"/>
+            <a:ext cx="3521984" cy="429599"/>
+          </a:xfrm>
+          <a:prstGeom prst="rect">
+            <a:avLst/>
+          </a:prstGeom>
+          <a:noFill/>
+          <a:ln w="38100">
+            <a:solidFill>
+              <a:srgbClr val="C00000"/>
+            </a:solidFill>
+          </a:ln>
+        </p:spPr>
+        <p:style>
+          <a:lnRef idx="2">
+            <a:schemeClr val="accent1">
+              <a:shade val="50000"/>
+            </a:schemeClr>
+          </a:lnRef>
+          <a:fillRef idx="1">
+            <a:schemeClr val="accent1"/>
+          </a:fillRef>
+          <a:effectRef idx="0">
+            <a:schemeClr val="accent1"/>
+          </a:effectRef>
+          <a:fontRef idx="minor">
+            <a:schemeClr val="lt1"/>
+          </a:fontRef>
+        </p:style>
+        <p:txBody>
+          <a:bodyPr rtlCol="0" anchor="ctr"/>
+          <a:lstStyle/>
+          <a:p>
+            <a:pPr algn="ctr"/>
+            <a:endParaRPr lang="pl-PL"/>
+          </a:p>
+        </p:txBody>
+      </p:sp>
+      <p:sp>
+        <p:nvSpPr>
+          <p:cNvPr id="20" name="Prostokąt 19">
+            <a:extLst>
+              <a:ext uri="{FF2B5EF4-FFF2-40B4-BE49-F238E27FC236}">
+                <a16:creationId xmlns:a16="http://schemas.microsoft.com/office/drawing/2014/main" id="{949503EB-3B83-46E3-B856-C880FD24270B}"/>
+              </a:ext>
+            </a:extLst>
+          </p:cNvPr>
+          <p:cNvSpPr/>
+          <p:nvPr/>
+        </p:nvSpPr>
+        <p:spPr>
+          <a:xfrm>
+            <a:off x="8976220" y="2039584"/>
+            <a:ext cx="3095538" cy="959817"/>
+          </a:xfrm>
+          <a:prstGeom prst="rect">
+            <a:avLst/>
+          </a:prstGeom>
+          <a:noFill/>
+          <a:ln w="38100">
+            <a:solidFill>
+              <a:srgbClr val="C00000"/>
+            </a:solidFill>
+          </a:ln>
+        </p:spPr>
+        <p:style>
+          <a:lnRef idx="2">
+            <a:schemeClr val="accent1">
+              <a:shade val="50000"/>
+            </a:schemeClr>
+          </a:lnRef>
+          <a:fillRef idx="1">
+            <a:schemeClr val="accent1"/>
+          </a:fillRef>
+          <a:effectRef idx="0">
+            <a:schemeClr val="accent1"/>
+          </a:effectRef>
+          <a:fontRef idx="minor">
+            <a:schemeClr val="lt1"/>
+          </a:fontRef>
+        </p:style>
+        <p:txBody>
+          <a:bodyPr rtlCol="0" anchor="ctr"/>
+          <a:lstStyle/>
+          <a:p>
+            <a:pPr algn="ctr"/>
+            <a:endParaRPr lang="pl-PL"/>
+          </a:p>
+        </p:txBody>
+      </p:sp>
+      <p:sp>
+        <p:nvSpPr>
+          <p:cNvPr id="14" name="Owal 13">
+            <a:extLst>
+              <a:ext uri="{FF2B5EF4-FFF2-40B4-BE49-F238E27FC236}">
+                <a16:creationId xmlns:a16="http://schemas.microsoft.com/office/drawing/2014/main" id="{774BDCA0-C025-4322-9D8C-0C72897EC2C1}"/>
+              </a:ext>
+            </a:extLst>
+          </p:cNvPr>
+          <p:cNvSpPr/>
+          <p:nvPr/>
+        </p:nvSpPr>
+        <p:spPr>
+          <a:xfrm>
+            <a:off x="4722292" y="1785646"/>
+            <a:ext cx="402671" cy="360727"/>
+          </a:xfrm>
+          <a:prstGeom prst="ellipse">
+            <a:avLst/>
+          </a:prstGeom>
+          <a:solidFill>
+            <a:srgbClr val="C00000"/>
+          </a:solidFill>
+        </p:spPr>
+        <p:style>
+          <a:lnRef idx="2">
+            <a:schemeClr val="accent2">
+              <a:shade val="50000"/>
+            </a:schemeClr>
+          </a:lnRef>
+          <a:fillRef idx="1">
+            <a:schemeClr val="accent2"/>
+          </a:fillRef>
+          <a:effectRef idx="0">
+            <a:schemeClr val="accent2"/>
+          </a:effectRef>
+          <a:fontRef idx="minor">
+            <a:schemeClr val="lt1"/>
+          </a:fontRef>
+        </p:style>
+        <p:txBody>
+          <a:bodyPr rtlCol="0" anchor="ctr"/>
+          <a:lstStyle/>
+          <a:p>
+            <a:pPr algn="ctr"/>
+            <a:r>
+              <a:rPr lang="pl-PL"/>
+              <a:t>5</a:t>
+            </a:r>
+          </a:p>
+        </p:txBody>
+      </p:sp>
+      <p:sp>
+        <p:nvSpPr>
+          <p:cNvPr id="15" name="Owal 14">
+            <a:extLst>
+              <a:ext uri="{FF2B5EF4-FFF2-40B4-BE49-F238E27FC236}">
+                <a16:creationId xmlns:a16="http://schemas.microsoft.com/office/drawing/2014/main" id="{05CD3EEE-CA10-41F2-AF6A-ADF551A85D76}"/>
+              </a:ext>
+            </a:extLst>
+          </p:cNvPr>
+          <p:cNvSpPr/>
+          <p:nvPr/>
+        </p:nvSpPr>
+        <p:spPr>
+          <a:xfrm>
+            <a:off x="4722292" y="2690607"/>
+            <a:ext cx="402671" cy="360727"/>
+          </a:xfrm>
+          <a:prstGeom prst="ellipse">
+            <a:avLst/>
+          </a:prstGeom>
+          <a:solidFill>
+            <a:srgbClr val="C00000"/>
+          </a:solidFill>
+        </p:spPr>
+        <p:style>
+          <a:lnRef idx="2">
+            <a:schemeClr val="accent2">
+              <a:shade val="50000"/>
+            </a:schemeClr>
+          </a:lnRef>
+          <a:fillRef idx="1">
+            <a:schemeClr val="accent2"/>
+          </a:fillRef>
+          <a:effectRef idx="0">
+            <a:schemeClr val="accent2"/>
+          </a:effectRef>
+          <a:fontRef idx="minor">
+            <a:schemeClr val="lt1"/>
+          </a:fontRef>
+        </p:style>
+        <p:txBody>
+          <a:bodyPr rtlCol="0" anchor="ctr"/>
+          <a:lstStyle/>
+          <a:p>
+            <a:pPr algn="ctr"/>
+            <a:r>
+              <a:rPr lang="pl-PL"/>
+              <a:t>6</a:t>
+            </a:r>
+          </a:p>
+        </p:txBody>
+      </p:sp>
+      <p:sp>
+        <p:nvSpPr>
+          <p:cNvPr id="16" name="Owal 15">
+            <a:extLst>
+              <a:ext uri="{FF2B5EF4-FFF2-40B4-BE49-F238E27FC236}">
+                <a16:creationId xmlns:a16="http://schemas.microsoft.com/office/drawing/2014/main" id="{C27A5AE7-0814-43FC-97C5-B2C0789C1457}"/>
+              </a:ext>
+            </a:extLst>
+          </p:cNvPr>
+          <p:cNvSpPr/>
+          <p:nvPr/>
+        </p:nvSpPr>
+        <p:spPr>
+          <a:xfrm>
+            <a:off x="8749718" y="1786855"/>
+            <a:ext cx="402671" cy="360727"/>
+          </a:xfrm>
+          <a:prstGeom prst="ellipse">
+            <a:avLst/>
+          </a:prstGeom>
+          <a:solidFill>
+            <a:srgbClr val="C00000"/>
+          </a:solidFill>
+        </p:spPr>
+        <p:style>
+          <a:lnRef idx="2">
+            <a:schemeClr val="accent2">
+              <a:shade val="50000"/>
+            </a:schemeClr>
+          </a:lnRef>
+          <a:fillRef idx="1">
+            <a:schemeClr val="accent2"/>
+          </a:fillRef>
+          <a:effectRef idx="0">
+            <a:schemeClr val="accent2"/>
+          </a:effectRef>
+          <a:fontRef idx="minor">
+            <a:schemeClr val="lt1"/>
+          </a:fontRef>
+        </p:style>
+        <p:txBody>
+          <a:bodyPr rtlCol="0" anchor="ctr"/>
+          <a:lstStyle/>
+          <a:p>
+            <a:pPr algn="ctr"/>
+            <a:r>
+              <a:rPr lang="pl-PL"/>
+              <a:t>7</a:t>
+            </a:r>
+          </a:p>
+        </p:txBody>
+      </p:sp>
+    </p:spTree>
+    <p:extLst>
+      <p:ext uri="{BB962C8B-B14F-4D97-AF65-F5344CB8AC3E}">
+        <p14:creationId xmlns:p14="http://schemas.microsoft.com/office/powerpoint/2010/main" val="1430500107"/>
+      </p:ext>
+    </p:extLst>
+  </p:cSld>
+  <p:clrMapOvr>
+    <a:masterClrMapping/>
+  </p:clrMapOvr>
+</p:sld>
+</file>
+
+<file path=ppt/slides/slide13.xml><?xml version="1.0" encoding="utf-8"?>
+<p:sld xmlns:a="http://schemas.openxmlformats.org/drawingml/2006/main" xmlns:r="http://schemas.openxmlformats.org/officeDocument/2006/relationships" xmlns:p="http://schemas.openxmlformats.org/presentationml/2006/main">
+  <p:cSld>
+    <p:spTree>
+      <p:nvGrpSpPr>
+        <p:cNvPr id="1" name=""/>
+        <p:cNvGrpSpPr/>
+        <p:nvPr/>
+      </p:nvGrpSpPr>
+      <p:grpSpPr>
+        <a:xfrm>
+          <a:off x="0" y="0"/>
+          <a:ext cx="0" cy="0"/>
+          <a:chOff x="0" y="0"/>
+          <a:chExt cx="0" cy="0"/>
+        </a:xfrm>
+      </p:grpSpPr>
+      <p:pic>
+        <p:nvPicPr>
+          <p:cNvPr id="3" name="Obraz 2">
+            <a:extLst>
+              <a:ext uri="{FF2B5EF4-FFF2-40B4-BE49-F238E27FC236}">
+                <a16:creationId xmlns:a16="http://schemas.microsoft.com/office/drawing/2014/main" id="{945E9DEA-9DCA-40F5-BB8E-D74FE87E07CC}"/>
+              </a:ext>
+            </a:extLst>
+          </p:cNvPr>
+          <p:cNvPicPr>
+            <a:picLocks noChangeAspect="1"/>
+          </p:cNvPicPr>
+          <p:nvPr/>
+        </p:nvPicPr>
+        <p:blipFill>
+          <a:blip r:embed="rId2"/>
+          <a:stretch>
+            <a:fillRect/>
+          </a:stretch>
+        </p:blipFill>
+        <p:spPr>
+          <a:xfrm>
+            <a:off x="0" y="356511"/>
+            <a:ext cx="12192000" cy="6144977"/>
+          </a:xfrm>
+          <a:prstGeom prst="rect">
+            <a:avLst/>
+          </a:prstGeom>
+        </p:spPr>
+      </p:pic>
+      <p:sp>
+        <p:nvSpPr>
+          <p:cNvPr id="6" name="Prostokąt 5">
+            <a:extLst>
+              <a:ext uri="{FF2B5EF4-FFF2-40B4-BE49-F238E27FC236}">
+                <a16:creationId xmlns:a16="http://schemas.microsoft.com/office/drawing/2014/main" id="{16F0A95E-C46C-4106-8609-493577FD511F}"/>
+              </a:ext>
+            </a:extLst>
+          </p:cNvPr>
+          <p:cNvSpPr/>
+          <p:nvPr/>
+        </p:nvSpPr>
+        <p:spPr>
+          <a:xfrm>
+            <a:off x="0" y="361419"/>
+            <a:ext cx="1971413" cy="989209"/>
+          </a:xfrm>
+          <a:prstGeom prst="rect">
+            <a:avLst/>
+          </a:prstGeom>
+          <a:noFill/>
+          <a:ln w="38100">
+            <a:solidFill>
+              <a:srgbClr val="C00000"/>
+            </a:solidFill>
+          </a:ln>
+        </p:spPr>
+        <p:style>
+          <a:lnRef idx="2">
+            <a:schemeClr val="accent1">
+              <a:shade val="50000"/>
+            </a:schemeClr>
+          </a:lnRef>
+          <a:fillRef idx="1">
+            <a:schemeClr val="accent1"/>
+          </a:fillRef>
+          <a:effectRef idx="0">
+            <a:schemeClr val="accent1"/>
+          </a:effectRef>
+          <a:fontRef idx="minor">
+            <a:schemeClr val="lt1"/>
+          </a:fontRef>
+        </p:style>
+        <p:txBody>
+          <a:bodyPr rtlCol="0" anchor="ctr"/>
+          <a:lstStyle/>
+          <a:p>
+            <a:pPr algn="ctr"/>
+            <a:endParaRPr lang="pl-PL"/>
+          </a:p>
+        </p:txBody>
+      </p:sp>
+      <p:sp>
+        <p:nvSpPr>
+          <p:cNvPr id="7" name="Prostokąt 6">
+            <a:extLst>
+              <a:ext uri="{FF2B5EF4-FFF2-40B4-BE49-F238E27FC236}">
+                <a16:creationId xmlns:a16="http://schemas.microsoft.com/office/drawing/2014/main" id="{D024C788-6B8C-4925-A384-D8953E6A7AED}"/>
+              </a:ext>
+            </a:extLst>
+          </p:cNvPr>
+          <p:cNvSpPr/>
+          <p:nvPr/>
+        </p:nvSpPr>
+        <p:spPr>
+          <a:xfrm>
+            <a:off x="0" y="361419"/>
+            <a:ext cx="12192000" cy="6135161"/>
+          </a:xfrm>
+          <a:prstGeom prst="rect">
+            <a:avLst/>
+          </a:prstGeom>
+          <a:noFill/>
+          <a:ln w="38100">
+            <a:solidFill>
+              <a:srgbClr val="C00000"/>
+            </a:solidFill>
+          </a:ln>
+        </p:spPr>
+        <p:style>
+          <a:lnRef idx="2">
+            <a:schemeClr val="accent1">
+              <a:shade val="50000"/>
+            </a:schemeClr>
+          </a:lnRef>
+          <a:fillRef idx="1">
+            <a:schemeClr val="accent1"/>
+          </a:fillRef>
+          <a:effectRef idx="0">
+            <a:schemeClr val="accent1"/>
+          </a:effectRef>
+          <a:fontRef idx="minor">
+            <a:schemeClr val="lt1"/>
+          </a:fontRef>
+        </p:style>
+        <p:txBody>
+          <a:bodyPr rtlCol="0" anchor="ctr"/>
+          <a:lstStyle/>
+          <a:p>
+            <a:pPr algn="ctr"/>
+            <a:endParaRPr lang="pl-PL"/>
+          </a:p>
+        </p:txBody>
+      </p:sp>
+      <p:sp>
+        <p:nvSpPr>
+          <p:cNvPr id="8" name="Prostokąt 7">
+            <a:extLst>
+              <a:ext uri="{FF2B5EF4-FFF2-40B4-BE49-F238E27FC236}">
+                <a16:creationId xmlns:a16="http://schemas.microsoft.com/office/drawing/2014/main" id="{16FB46F9-F620-4AD8-A26F-EA222D2A29FD}"/>
+              </a:ext>
+            </a:extLst>
+          </p:cNvPr>
+          <p:cNvSpPr/>
+          <p:nvPr/>
+        </p:nvSpPr>
+        <p:spPr>
+          <a:xfrm>
+            <a:off x="-1" y="362818"/>
+            <a:ext cx="1971413" cy="6133762"/>
+          </a:xfrm>
+          <a:prstGeom prst="rect">
+            <a:avLst/>
+          </a:prstGeom>
+          <a:noFill/>
+          <a:ln w="38100">
+            <a:solidFill>
+              <a:srgbClr val="C00000"/>
+            </a:solidFill>
+          </a:ln>
+        </p:spPr>
+        <p:style>
+          <a:lnRef idx="2">
+            <a:schemeClr val="accent1">
+              <a:shade val="50000"/>
+            </a:schemeClr>
+          </a:lnRef>
+          <a:fillRef idx="1">
+            <a:schemeClr val="accent1"/>
+          </a:fillRef>
+          <a:effectRef idx="0">
+            <a:schemeClr val="accent1"/>
+          </a:effectRef>
+          <a:fontRef idx="minor">
+            <a:schemeClr val="lt1"/>
+          </a:fontRef>
+        </p:style>
+        <p:txBody>
+          <a:bodyPr rtlCol="0" anchor="ctr"/>
+          <a:lstStyle/>
+          <a:p>
+            <a:pPr algn="ctr"/>
+            <a:endParaRPr lang="pl-PL"/>
+          </a:p>
+        </p:txBody>
+      </p:sp>
+      <p:sp>
+        <p:nvSpPr>
+          <p:cNvPr id="11" name="Owal 10">
+            <a:extLst>
+              <a:ext uri="{FF2B5EF4-FFF2-40B4-BE49-F238E27FC236}">
+                <a16:creationId xmlns:a16="http://schemas.microsoft.com/office/drawing/2014/main" id="{0E7B7507-53E9-4688-94E1-ED40EF460D70}"/>
+              </a:ext>
+            </a:extLst>
+          </p:cNvPr>
+          <p:cNvSpPr/>
+          <p:nvPr/>
+        </p:nvSpPr>
+        <p:spPr>
+          <a:xfrm>
+            <a:off x="2063690" y="675659"/>
+            <a:ext cx="402671" cy="360727"/>
+          </a:xfrm>
+          <a:prstGeom prst="ellipse">
+            <a:avLst/>
+          </a:prstGeom>
+          <a:solidFill>
+            <a:srgbClr val="C00000"/>
+          </a:solidFill>
+        </p:spPr>
+        <p:style>
+          <a:lnRef idx="2">
+            <a:schemeClr val="accent2">
+              <a:shade val="50000"/>
+            </a:schemeClr>
+          </a:lnRef>
+          <a:fillRef idx="1">
+            <a:schemeClr val="accent2"/>
+          </a:fillRef>
+          <a:effectRef idx="0">
+            <a:schemeClr val="accent2"/>
+          </a:effectRef>
+          <a:fontRef idx="minor">
+            <a:schemeClr val="lt1"/>
+          </a:fontRef>
+        </p:style>
+        <p:txBody>
+          <a:bodyPr rtlCol="0" anchor="ctr"/>
+          <a:lstStyle/>
+          <a:p>
+            <a:pPr algn="ctr"/>
+            <a:r>
+              <a:rPr lang="pl-PL"/>
+              <a:t>1</a:t>
+            </a:r>
+          </a:p>
+        </p:txBody>
+      </p:sp>
+      <p:sp>
+        <p:nvSpPr>
+          <p:cNvPr id="12" name="Owal 11">
+            <a:extLst>
+              <a:ext uri="{FF2B5EF4-FFF2-40B4-BE49-F238E27FC236}">
+                <a16:creationId xmlns:a16="http://schemas.microsoft.com/office/drawing/2014/main" id="{9279B823-E10D-4FA5-A8B5-8E156EC9D0C5}"/>
+              </a:ext>
+            </a:extLst>
+          </p:cNvPr>
+          <p:cNvSpPr/>
+          <p:nvPr/>
+        </p:nvSpPr>
+        <p:spPr>
+          <a:xfrm>
+            <a:off x="10489035" y="675658"/>
+            <a:ext cx="402671" cy="360727"/>
+          </a:xfrm>
+          <a:prstGeom prst="ellipse">
+            <a:avLst/>
+          </a:prstGeom>
+          <a:solidFill>
+            <a:srgbClr val="C00000"/>
+          </a:solidFill>
+        </p:spPr>
+        <p:style>
+          <a:lnRef idx="2">
+            <a:schemeClr val="accent2">
+              <a:shade val="50000"/>
+            </a:schemeClr>
+          </a:lnRef>
+          <a:fillRef idx="1">
+            <a:schemeClr val="accent2"/>
+          </a:fillRef>
+          <a:effectRef idx="0">
+            <a:schemeClr val="accent2"/>
+          </a:effectRef>
+          <a:fontRef idx="minor">
+            <a:schemeClr val="lt1"/>
+          </a:fontRef>
+        </p:style>
+        <p:txBody>
+          <a:bodyPr rtlCol="0" anchor="ctr"/>
+          <a:lstStyle/>
+          <a:p>
+            <a:pPr algn="ctr"/>
+            <a:r>
+              <a:rPr lang="pl-PL"/>
+              <a:t>2</a:t>
+            </a:r>
+          </a:p>
+        </p:txBody>
+      </p:sp>
+      <p:sp>
+        <p:nvSpPr>
+          <p:cNvPr id="13" name="Owal 12">
+            <a:extLst>
+              <a:ext uri="{FF2B5EF4-FFF2-40B4-BE49-F238E27FC236}">
+                <a16:creationId xmlns:a16="http://schemas.microsoft.com/office/drawing/2014/main" id="{D45DF03F-F915-4A56-A693-33B93226676C}"/>
+              </a:ext>
+            </a:extLst>
+          </p:cNvPr>
+          <p:cNvSpPr/>
+          <p:nvPr/>
+        </p:nvSpPr>
+        <p:spPr>
+          <a:xfrm>
+            <a:off x="2041319" y="2480689"/>
+            <a:ext cx="402671" cy="360727"/>
+          </a:xfrm>
+          <a:prstGeom prst="ellipse">
+            <a:avLst/>
+          </a:prstGeom>
+          <a:solidFill>
+            <a:srgbClr val="C00000"/>
+          </a:solidFill>
+        </p:spPr>
+        <p:style>
+          <a:lnRef idx="2">
+            <a:schemeClr val="accent2">
+              <a:shade val="50000"/>
+            </a:schemeClr>
+          </a:lnRef>
+          <a:fillRef idx="1">
+            <a:schemeClr val="accent2"/>
+          </a:fillRef>
+          <a:effectRef idx="0">
+            <a:schemeClr val="accent2"/>
+          </a:effectRef>
+          <a:fontRef idx="minor">
+            <a:schemeClr val="lt1"/>
+          </a:fontRef>
+        </p:style>
+        <p:txBody>
+          <a:bodyPr rtlCol="0" anchor="ctr"/>
+          <a:lstStyle/>
+          <a:p>
+            <a:pPr algn="ctr"/>
+            <a:r>
+              <a:rPr lang="pl-PL"/>
+              <a:t>3</a:t>
+            </a:r>
+          </a:p>
+        </p:txBody>
+      </p:sp>
+      <p:sp>
+        <p:nvSpPr>
+          <p:cNvPr id="14" name="Owal 13">
+            <a:extLst>
+              <a:ext uri="{FF2B5EF4-FFF2-40B4-BE49-F238E27FC236}">
+                <a16:creationId xmlns:a16="http://schemas.microsoft.com/office/drawing/2014/main" id="{A6C0C84E-1BF8-40B7-8601-1592B2F2F0BF}"/>
+              </a:ext>
+            </a:extLst>
+          </p:cNvPr>
+          <p:cNvSpPr/>
+          <p:nvPr/>
+        </p:nvSpPr>
+        <p:spPr>
+          <a:xfrm>
+            <a:off x="5557705" y="2480689"/>
+            <a:ext cx="402671" cy="360727"/>
+          </a:xfrm>
+          <a:prstGeom prst="ellipse">
+            <a:avLst/>
+          </a:prstGeom>
+          <a:solidFill>
+            <a:srgbClr val="C00000"/>
+          </a:solidFill>
+        </p:spPr>
+        <p:style>
+          <a:lnRef idx="2">
+            <a:schemeClr val="accent2">
+              <a:shade val="50000"/>
+            </a:schemeClr>
+          </a:lnRef>
+          <a:fillRef idx="1">
+            <a:schemeClr val="accent2"/>
+          </a:fillRef>
+          <a:effectRef idx="0">
+            <a:schemeClr val="accent2"/>
+          </a:effectRef>
+          <a:fontRef idx="minor">
+            <a:schemeClr val="lt1"/>
+          </a:fontRef>
+        </p:style>
+        <p:txBody>
+          <a:bodyPr rtlCol="0" anchor="ctr"/>
+          <a:lstStyle/>
+          <a:p>
+            <a:pPr algn="ctr"/>
+            <a:r>
+              <a:rPr lang="pl-PL"/>
+              <a:t>4</a:t>
+            </a:r>
+          </a:p>
+        </p:txBody>
+      </p:sp>
+      <p:sp>
+        <p:nvSpPr>
+          <p:cNvPr id="15" name="Owal 14">
+            <a:extLst>
+              <a:ext uri="{FF2B5EF4-FFF2-40B4-BE49-F238E27FC236}">
+                <a16:creationId xmlns:a16="http://schemas.microsoft.com/office/drawing/2014/main" id="{89BA9539-1396-49DD-ADE7-4C3DF3384028}"/>
+              </a:ext>
+            </a:extLst>
+          </p:cNvPr>
+          <p:cNvSpPr/>
+          <p:nvPr/>
+        </p:nvSpPr>
+        <p:spPr>
+          <a:xfrm>
+            <a:off x="10489034" y="5569236"/>
+            <a:ext cx="402671" cy="360727"/>
+          </a:xfrm>
+          <a:prstGeom prst="ellipse">
+            <a:avLst/>
+          </a:prstGeom>
+          <a:solidFill>
+            <a:srgbClr val="C00000"/>
+          </a:solidFill>
+        </p:spPr>
+        <p:style>
+          <a:lnRef idx="2">
+            <a:schemeClr val="accent2">
+              <a:shade val="50000"/>
+            </a:schemeClr>
+          </a:lnRef>
+          <a:fillRef idx="1">
+            <a:schemeClr val="accent2"/>
+          </a:fillRef>
+          <a:effectRef idx="0">
+            <a:schemeClr val="accent2"/>
+          </a:effectRef>
+          <a:fontRef idx="minor">
+            <a:schemeClr val="lt1"/>
+          </a:fontRef>
+        </p:style>
+        <p:txBody>
+          <a:bodyPr rtlCol="0" anchor="ctr"/>
+          <a:lstStyle/>
+          <a:p>
+            <a:pPr algn="ctr"/>
+            <a:r>
+              <a:rPr lang="pl-PL"/>
+              <a:t>5</a:t>
             </a:r>
           </a:p>
         </p:txBody>
@@ -5055,7 +6535,587 @@
 </p:sld>
 </file>
 
-<file path=ppt/slides/slide12.xml><?xml version="1.0" encoding="utf-8"?>
+<file path=ppt/slides/slide14.xml><?xml version="1.0" encoding="utf-8"?>
+<p:sld xmlns:a="http://schemas.openxmlformats.org/drawingml/2006/main" xmlns:r="http://schemas.openxmlformats.org/officeDocument/2006/relationships" xmlns:p="http://schemas.openxmlformats.org/presentationml/2006/main">
+  <p:cSld>
+    <p:spTree>
+      <p:nvGrpSpPr>
+        <p:cNvPr id="1" name=""/>
+        <p:cNvGrpSpPr/>
+        <p:nvPr/>
+      </p:nvGrpSpPr>
+      <p:grpSpPr>
+        <a:xfrm>
+          <a:off x="0" y="0"/>
+          <a:ext cx="0" cy="0"/>
+          <a:chOff x="0" y="0"/>
+          <a:chExt cx="0" cy="0"/>
+        </a:xfrm>
+      </p:grpSpPr>
+      <p:pic>
+        <p:nvPicPr>
+          <p:cNvPr id="4" name="Obraz 3">
+            <a:extLst>
+              <a:ext uri="{FF2B5EF4-FFF2-40B4-BE49-F238E27FC236}">
+                <a16:creationId xmlns:a16="http://schemas.microsoft.com/office/drawing/2014/main" id="{1AECE878-B7DB-4017-A93D-CB9D834AB9CB}"/>
+              </a:ext>
+            </a:extLst>
+          </p:cNvPr>
+          <p:cNvPicPr>
+            <a:picLocks noChangeAspect="1"/>
+          </p:cNvPicPr>
+          <p:nvPr/>
+        </p:nvPicPr>
+        <p:blipFill>
+          <a:blip r:embed="rId2"/>
+          <a:stretch>
+            <a:fillRect/>
+          </a:stretch>
+        </p:blipFill>
+        <p:spPr>
+          <a:xfrm>
+            <a:off x="0" y="356485"/>
+            <a:ext cx="12192000" cy="6145029"/>
+          </a:xfrm>
+          <a:prstGeom prst="rect">
+            <a:avLst/>
+          </a:prstGeom>
+        </p:spPr>
+      </p:pic>
+      <p:sp>
+        <p:nvSpPr>
+          <p:cNvPr id="6" name="Prostokąt 5">
+            <a:extLst>
+              <a:ext uri="{FF2B5EF4-FFF2-40B4-BE49-F238E27FC236}">
+                <a16:creationId xmlns:a16="http://schemas.microsoft.com/office/drawing/2014/main" id="{16F0A95E-C46C-4106-8609-493577FD511F}"/>
+              </a:ext>
+            </a:extLst>
+          </p:cNvPr>
+          <p:cNvSpPr/>
+          <p:nvPr/>
+        </p:nvSpPr>
+        <p:spPr>
+          <a:xfrm>
+            <a:off x="0" y="361419"/>
+            <a:ext cx="1971413" cy="989209"/>
+          </a:xfrm>
+          <a:prstGeom prst="rect">
+            <a:avLst/>
+          </a:prstGeom>
+          <a:noFill/>
+          <a:ln w="38100">
+            <a:solidFill>
+              <a:srgbClr val="C00000"/>
+            </a:solidFill>
+          </a:ln>
+        </p:spPr>
+        <p:style>
+          <a:lnRef idx="2">
+            <a:schemeClr val="accent1">
+              <a:shade val="50000"/>
+            </a:schemeClr>
+          </a:lnRef>
+          <a:fillRef idx="1">
+            <a:schemeClr val="accent1"/>
+          </a:fillRef>
+          <a:effectRef idx="0">
+            <a:schemeClr val="accent1"/>
+          </a:effectRef>
+          <a:fontRef idx="minor">
+            <a:schemeClr val="lt1"/>
+          </a:fontRef>
+        </p:style>
+        <p:txBody>
+          <a:bodyPr rtlCol="0" anchor="ctr"/>
+          <a:lstStyle/>
+          <a:p>
+            <a:pPr algn="ctr"/>
+            <a:endParaRPr lang="pl-PL"/>
+          </a:p>
+        </p:txBody>
+      </p:sp>
+      <p:sp>
+        <p:nvSpPr>
+          <p:cNvPr id="7" name="Prostokąt 6">
+            <a:extLst>
+              <a:ext uri="{FF2B5EF4-FFF2-40B4-BE49-F238E27FC236}">
+                <a16:creationId xmlns:a16="http://schemas.microsoft.com/office/drawing/2014/main" id="{D024C788-6B8C-4925-A384-D8953E6A7AED}"/>
+              </a:ext>
+            </a:extLst>
+          </p:cNvPr>
+          <p:cNvSpPr/>
+          <p:nvPr/>
+        </p:nvSpPr>
+        <p:spPr>
+          <a:xfrm>
+            <a:off x="0" y="361419"/>
+            <a:ext cx="12192000" cy="6135161"/>
+          </a:xfrm>
+          <a:prstGeom prst="rect">
+            <a:avLst/>
+          </a:prstGeom>
+          <a:noFill/>
+          <a:ln w="38100">
+            <a:solidFill>
+              <a:srgbClr val="C00000"/>
+            </a:solidFill>
+          </a:ln>
+        </p:spPr>
+        <p:style>
+          <a:lnRef idx="2">
+            <a:schemeClr val="accent1">
+              <a:shade val="50000"/>
+            </a:schemeClr>
+          </a:lnRef>
+          <a:fillRef idx="1">
+            <a:schemeClr val="accent1"/>
+          </a:fillRef>
+          <a:effectRef idx="0">
+            <a:schemeClr val="accent1"/>
+          </a:effectRef>
+          <a:fontRef idx="minor">
+            <a:schemeClr val="lt1"/>
+          </a:fontRef>
+        </p:style>
+        <p:txBody>
+          <a:bodyPr rtlCol="0" anchor="ctr"/>
+          <a:lstStyle/>
+          <a:p>
+            <a:pPr algn="ctr"/>
+            <a:endParaRPr lang="pl-PL"/>
+          </a:p>
+        </p:txBody>
+      </p:sp>
+      <p:sp>
+        <p:nvSpPr>
+          <p:cNvPr id="8" name="Prostokąt 7">
+            <a:extLst>
+              <a:ext uri="{FF2B5EF4-FFF2-40B4-BE49-F238E27FC236}">
+                <a16:creationId xmlns:a16="http://schemas.microsoft.com/office/drawing/2014/main" id="{16FB46F9-F620-4AD8-A26F-EA222D2A29FD}"/>
+              </a:ext>
+            </a:extLst>
+          </p:cNvPr>
+          <p:cNvSpPr/>
+          <p:nvPr/>
+        </p:nvSpPr>
+        <p:spPr>
+          <a:xfrm>
+            <a:off x="-1" y="362818"/>
+            <a:ext cx="1971413" cy="6133762"/>
+          </a:xfrm>
+          <a:prstGeom prst="rect">
+            <a:avLst/>
+          </a:prstGeom>
+          <a:noFill/>
+          <a:ln w="38100">
+            <a:solidFill>
+              <a:srgbClr val="C00000"/>
+            </a:solidFill>
+          </a:ln>
+        </p:spPr>
+        <p:style>
+          <a:lnRef idx="2">
+            <a:schemeClr val="accent1">
+              <a:shade val="50000"/>
+            </a:schemeClr>
+          </a:lnRef>
+          <a:fillRef idx="1">
+            <a:schemeClr val="accent1"/>
+          </a:fillRef>
+          <a:effectRef idx="0">
+            <a:schemeClr val="accent1"/>
+          </a:effectRef>
+          <a:fontRef idx="minor">
+            <a:schemeClr val="lt1"/>
+          </a:fontRef>
+        </p:style>
+        <p:txBody>
+          <a:bodyPr rtlCol="0" anchor="ctr"/>
+          <a:lstStyle/>
+          <a:p>
+            <a:pPr algn="ctr"/>
+            <a:endParaRPr lang="pl-PL"/>
+          </a:p>
+        </p:txBody>
+      </p:sp>
+      <p:sp>
+        <p:nvSpPr>
+          <p:cNvPr id="9" name="Owal 8">
+            <a:extLst>
+              <a:ext uri="{FF2B5EF4-FFF2-40B4-BE49-F238E27FC236}">
+                <a16:creationId xmlns:a16="http://schemas.microsoft.com/office/drawing/2014/main" id="{BE4091C0-D10F-4949-B109-0A4051D674E0}"/>
+              </a:ext>
+            </a:extLst>
+          </p:cNvPr>
+          <p:cNvSpPr/>
+          <p:nvPr/>
+        </p:nvSpPr>
+        <p:spPr>
+          <a:xfrm>
+            <a:off x="1300294" y="545284"/>
+            <a:ext cx="402671" cy="360727"/>
+          </a:xfrm>
+          <a:prstGeom prst="ellipse">
+            <a:avLst/>
+          </a:prstGeom>
+          <a:solidFill>
+            <a:srgbClr val="C00000"/>
+          </a:solidFill>
+        </p:spPr>
+        <p:style>
+          <a:lnRef idx="2">
+            <a:schemeClr val="accent2">
+              <a:shade val="50000"/>
+            </a:schemeClr>
+          </a:lnRef>
+          <a:fillRef idx="1">
+            <a:schemeClr val="accent2"/>
+          </a:fillRef>
+          <a:effectRef idx="0">
+            <a:schemeClr val="accent2"/>
+          </a:effectRef>
+          <a:fontRef idx="minor">
+            <a:schemeClr val="lt1"/>
+          </a:fontRef>
+        </p:style>
+        <p:txBody>
+          <a:bodyPr rtlCol="0" anchor="ctr"/>
+          <a:lstStyle/>
+          <a:p>
+            <a:pPr algn="ctr"/>
+            <a:r>
+              <a:rPr lang="pl-PL"/>
+              <a:t>1</a:t>
+            </a:r>
+          </a:p>
+        </p:txBody>
+      </p:sp>
+      <p:sp>
+        <p:nvSpPr>
+          <p:cNvPr id="10" name="Owal 9">
+            <a:extLst>
+              <a:ext uri="{FF2B5EF4-FFF2-40B4-BE49-F238E27FC236}">
+                <a16:creationId xmlns:a16="http://schemas.microsoft.com/office/drawing/2014/main" id="{D8DEDFBA-0286-48C5-AD73-5E1C21954FC6}"/>
+              </a:ext>
+            </a:extLst>
+          </p:cNvPr>
+          <p:cNvSpPr/>
+          <p:nvPr/>
+        </p:nvSpPr>
+        <p:spPr>
+          <a:xfrm>
+            <a:off x="1501629" y="1392573"/>
+            <a:ext cx="402671" cy="360727"/>
+          </a:xfrm>
+          <a:prstGeom prst="ellipse">
+            <a:avLst/>
+          </a:prstGeom>
+          <a:solidFill>
+            <a:srgbClr val="C00000"/>
+          </a:solidFill>
+        </p:spPr>
+        <p:style>
+          <a:lnRef idx="2">
+            <a:schemeClr val="accent2">
+              <a:shade val="50000"/>
+            </a:schemeClr>
+          </a:lnRef>
+          <a:fillRef idx="1">
+            <a:schemeClr val="accent2"/>
+          </a:fillRef>
+          <a:effectRef idx="0">
+            <a:schemeClr val="accent2"/>
+          </a:effectRef>
+          <a:fontRef idx="minor">
+            <a:schemeClr val="lt1"/>
+          </a:fontRef>
+        </p:style>
+        <p:txBody>
+          <a:bodyPr rtlCol="0" anchor="ctr"/>
+          <a:lstStyle/>
+          <a:p>
+            <a:pPr algn="ctr"/>
+            <a:r>
+              <a:rPr lang="pl-PL"/>
+              <a:t>2</a:t>
+            </a:r>
+          </a:p>
+        </p:txBody>
+      </p:sp>
+      <p:sp>
+        <p:nvSpPr>
+          <p:cNvPr id="11" name="Owal 10">
+            <a:extLst>
+              <a:ext uri="{FF2B5EF4-FFF2-40B4-BE49-F238E27FC236}">
+                <a16:creationId xmlns:a16="http://schemas.microsoft.com/office/drawing/2014/main" id="{0E7B7507-53E9-4688-94E1-ED40EF460D70}"/>
+              </a:ext>
+            </a:extLst>
+          </p:cNvPr>
+          <p:cNvSpPr/>
+          <p:nvPr/>
+        </p:nvSpPr>
+        <p:spPr>
+          <a:xfrm>
+            <a:off x="2063690" y="675659"/>
+            <a:ext cx="402671" cy="360727"/>
+          </a:xfrm>
+          <a:prstGeom prst="ellipse">
+            <a:avLst/>
+          </a:prstGeom>
+          <a:solidFill>
+            <a:srgbClr val="C00000"/>
+          </a:solidFill>
+        </p:spPr>
+        <p:style>
+          <a:lnRef idx="2">
+            <a:schemeClr val="accent2">
+              <a:shade val="50000"/>
+            </a:schemeClr>
+          </a:lnRef>
+          <a:fillRef idx="1">
+            <a:schemeClr val="accent2"/>
+          </a:fillRef>
+          <a:effectRef idx="0">
+            <a:schemeClr val="accent2"/>
+          </a:effectRef>
+          <a:fontRef idx="minor">
+            <a:schemeClr val="lt1"/>
+          </a:fontRef>
+        </p:style>
+        <p:txBody>
+          <a:bodyPr rtlCol="0" anchor="ctr"/>
+          <a:lstStyle/>
+          <a:p>
+            <a:pPr algn="ctr"/>
+            <a:r>
+              <a:rPr lang="pl-PL"/>
+              <a:t>3</a:t>
+            </a:r>
+          </a:p>
+        </p:txBody>
+      </p:sp>
+      <p:sp>
+        <p:nvSpPr>
+          <p:cNvPr id="12" name="Owal 11">
+            <a:extLst>
+              <a:ext uri="{FF2B5EF4-FFF2-40B4-BE49-F238E27FC236}">
+                <a16:creationId xmlns:a16="http://schemas.microsoft.com/office/drawing/2014/main" id="{9279B823-E10D-4FA5-A8B5-8E156EC9D0C5}"/>
+              </a:ext>
+            </a:extLst>
+          </p:cNvPr>
+          <p:cNvSpPr/>
+          <p:nvPr/>
+        </p:nvSpPr>
+        <p:spPr>
+          <a:xfrm>
+            <a:off x="10489035" y="675658"/>
+            <a:ext cx="402671" cy="360727"/>
+          </a:xfrm>
+          <a:prstGeom prst="ellipse">
+            <a:avLst/>
+          </a:prstGeom>
+          <a:solidFill>
+            <a:srgbClr val="C00000"/>
+          </a:solidFill>
+        </p:spPr>
+        <p:style>
+          <a:lnRef idx="2">
+            <a:schemeClr val="accent2">
+              <a:shade val="50000"/>
+            </a:schemeClr>
+          </a:lnRef>
+          <a:fillRef idx="1">
+            <a:schemeClr val="accent2"/>
+          </a:fillRef>
+          <a:effectRef idx="0">
+            <a:schemeClr val="accent2"/>
+          </a:effectRef>
+          <a:fontRef idx="minor">
+            <a:schemeClr val="lt1"/>
+          </a:fontRef>
+        </p:style>
+        <p:txBody>
+          <a:bodyPr rtlCol="0" anchor="ctr"/>
+          <a:lstStyle/>
+          <a:p>
+            <a:pPr algn="ctr"/>
+            <a:r>
+              <a:rPr lang="pl-PL"/>
+              <a:t>4</a:t>
+            </a:r>
+          </a:p>
+        </p:txBody>
+      </p:sp>
+      <p:sp>
+        <p:nvSpPr>
+          <p:cNvPr id="13" name="Owal 12">
+            <a:extLst>
+              <a:ext uri="{FF2B5EF4-FFF2-40B4-BE49-F238E27FC236}">
+                <a16:creationId xmlns:a16="http://schemas.microsoft.com/office/drawing/2014/main" id="{D45DF03F-F915-4A56-A693-33B93226676C}"/>
+              </a:ext>
+            </a:extLst>
+          </p:cNvPr>
+          <p:cNvSpPr/>
+          <p:nvPr/>
+        </p:nvSpPr>
+        <p:spPr>
+          <a:xfrm>
+            <a:off x="2041319" y="2480689"/>
+            <a:ext cx="402671" cy="360727"/>
+          </a:xfrm>
+          <a:prstGeom prst="ellipse">
+            <a:avLst/>
+          </a:prstGeom>
+          <a:solidFill>
+            <a:srgbClr val="C00000"/>
+          </a:solidFill>
+        </p:spPr>
+        <p:style>
+          <a:lnRef idx="2">
+            <a:schemeClr val="accent2">
+              <a:shade val="50000"/>
+            </a:schemeClr>
+          </a:lnRef>
+          <a:fillRef idx="1">
+            <a:schemeClr val="accent2"/>
+          </a:fillRef>
+          <a:effectRef idx="0">
+            <a:schemeClr val="accent2"/>
+          </a:effectRef>
+          <a:fontRef idx="minor">
+            <a:schemeClr val="lt1"/>
+          </a:fontRef>
+        </p:style>
+        <p:txBody>
+          <a:bodyPr rtlCol="0" anchor="ctr"/>
+          <a:lstStyle/>
+          <a:p>
+            <a:pPr algn="ctr"/>
+            <a:r>
+              <a:rPr lang="pl-PL"/>
+              <a:t>5</a:t>
+            </a:r>
+          </a:p>
+        </p:txBody>
+      </p:sp>
+      <p:sp>
+        <p:nvSpPr>
+          <p:cNvPr id="14" name="Owal 13">
+            <a:extLst>
+              <a:ext uri="{FF2B5EF4-FFF2-40B4-BE49-F238E27FC236}">
+                <a16:creationId xmlns:a16="http://schemas.microsoft.com/office/drawing/2014/main" id="{A6C0C84E-1BF8-40B7-8601-1592B2F2F0BF}"/>
+              </a:ext>
+            </a:extLst>
+          </p:cNvPr>
+          <p:cNvSpPr/>
+          <p:nvPr/>
+        </p:nvSpPr>
+        <p:spPr>
+          <a:xfrm>
+            <a:off x="5557705" y="2480689"/>
+            <a:ext cx="402671" cy="360727"/>
+          </a:xfrm>
+          <a:prstGeom prst="ellipse">
+            <a:avLst/>
+          </a:prstGeom>
+          <a:solidFill>
+            <a:srgbClr val="C00000"/>
+          </a:solidFill>
+        </p:spPr>
+        <p:style>
+          <a:lnRef idx="2">
+            <a:schemeClr val="accent2">
+              <a:shade val="50000"/>
+            </a:schemeClr>
+          </a:lnRef>
+          <a:fillRef idx="1">
+            <a:schemeClr val="accent2"/>
+          </a:fillRef>
+          <a:effectRef idx="0">
+            <a:schemeClr val="accent2"/>
+          </a:effectRef>
+          <a:fontRef idx="minor">
+            <a:schemeClr val="lt1"/>
+          </a:fontRef>
+        </p:style>
+        <p:txBody>
+          <a:bodyPr rtlCol="0" anchor="ctr"/>
+          <a:lstStyle/>
+          <a:p>
+            <a:pPr algn="ctr"/>
+            <a:r>
+              <a:rPr lang="pl-PL"/>
+              <a:t>6</a:t>
+            </a:r>
+          </a:p>
+        </p:txBody>
+      </p:sp>
+      <p:sp>
+        <p:nvSpPr>
+          <p:cNvPr id="15" name="Owal 14">
+            <a:extLst>
+              <a:ext uri="{FF2B5EF4-FFF2-40B4-BE49-F238E27FC236}">
+                <a16:creationId xmlns:a16="http://schemas.microsoft.com/office/drawing/2014/main" id="{89BA9539-1396-49DD-ADE7-4C3DF3384028}"/>
+              </a:ext>
+            </a:extLst>
+          </p:cNvPr>
+          <p:cNvSpPr/>
+          <p:nvPr/>
+        </p:nvSpPr>
+        <p:spPr>
+          <a:xfrm>
+            <a:off x="10489034" y="4663225"/>
+            <a:ext cx="402671" cy="360727"/>
+          </a:xfrm>
+          <a:prstGeom prst="ellipse">
+            <a:avLst/>
+          </a:prstGeom>
+          <a:solidFill>
+            <a:srgbClr val="C00000"/>
+          </a:solidFill>
+        </p:spPr>
+        <p:style>
+          <a:lnRef idx="2">
+            <a:schemeClr val="accent2">
+              <a:shade val="50000"/>
+            </a:schemeClr>
+          </a:lnRef>
+          <a:fillRef idx="1">
+            <a:schemeClr val="accent2"/>
+          </a:fillRef>
+          <a:effectRef idx="0">
+            <a:schemeClr val="accent2"/>
+          </a:effectRef>
+          <a:fontRef idx="minor">
+            <a:schemeClr val="lt1"/>
+          </a:fontRef>
+        </p:style>
+        <p:txBody>
+          <a:bodyPr rtlCol="0" anchor="ctr"/>
+          <a:lstStyle/>
+          <a:p>
+            <a:pPr algn="ctr"/>
+            <a:r>
+              <a:rPr lang="pl-PL"/>
+              <a:t>7</a:t>
+            </a:r>
+          </a:p>
+        </p:txBody>
+      </p:sp>
+    </p:spTree>
+    <p:extLst>
+      <p:ext uri="{BB962C8B-B14F-4D97-AF65-F5344CB8AC3E}">
+        <p14:creationId xmlns:p14="http://schemas.microsoft.com/office/powerpoint/2010/main" val="3512685534"/>
+      </p:ext>
+    </p:extLst>
+  </p:cSld>
+  <p:clrMapOvr>
+    <a:masterClrMapping/>
+  </p:clrMapOvr>
+</p:sld>
+</file>
+
+<file path=ppt/slides/slide15.xml><?xml version="1.0" encoding="utf-8"?>
 <p:sld xmlns:a="http://schemas.openxmlformats.org/drawingml/2006/main" xmlns:r="http://schemas.openxmlformats.org/officeDocument/2006/relationships" xmlns:p="http://schemas.openxmlformats.org/presentationml/2006/main">
   <p:cSld>
     <p:spTree>
@@ -7815,7 +9875,7 @@
           <p:cNvPr id="4" name="Obraz 3">
             <a:extLst>
               <a:ext uri="{FF2B5EF4-FFF2-40B4-BE49-F238E27FC236}">
-                <a16:creationId xmlns:a16="http://schemas.microsoft.com/office/drawing/2014/main" id="{5E99E619-A3B3-422A-8C7A-B064B9A91684}"/>
+                <a16:creationId xmlns:a16="http://schemas.microsoft.com/office/drawing/2014/main" id="{7920C8E0-BE7B-48FF-AECB-E531D77CA345}"/>
               </a:ext>
             </a:extLst>
           </p:cNvPr>
@@ -7832,8 +9892,8 @@
         </p:blipFill>
         <p:spPr>
           <a:xfrm>
-            <a:off x="0" y="363188"/>
-            <a:ext cx="12192000" cy="6131994"/>
+            <a:off x="0" y="385871"/>
+            <a:ext cx="12192000" cy="6086257"/>
           </a:xfrm>
           <a:prstGeom prst="rect">
             <a:avLst/>
@@ -7907,7 +9967,7 @@
         <p:spPr>
           <a:xfrm>
             <a:off x="0" y="361419"/>
-            <a:ext cx="12192000" cy="5477319"/>
+            <a:ext cx="12192000" cy="6135161"/>
           </a:xfrm>
           <a:prstGeom prst="rect">
             <a:avLst/>
@@ -8154,19 +10214,19 @@
       </p:sp>
       <p:sp>
         <p:nvSpPr>
-          <p:cNvPr id="13" name="Owal 12">
-            <a:extLst>
-              <a:ext uri="{FF2B5EF4-FFF2-40B4-BE49-F238E27FC236}">
-                <a16:creationId xmlns:a16="http://schemas.microsoft.com/office/drawing/2014/main" id="{58460A97-B22B-4B2D-A02C-08C333DFB3BA}"/>
-              </a:ext>
-            </a:extLst>
-          </p:cNvPr>
-          <p:cNvSpPr/>
-          <p:nvPr/>
-        </p:nvSpPr>
-        <p:spPr>
-          <a:xfrm>
-            <a:off x="2903987" y="1937669"/>
+          <p:cNvPr id="12" name="Owal 11">
+            <a:extLst>
+              <a:ext uri="{FF2B5EF4-FFF2-40B4-BE49-F238E27FC236}">
+                <a16:creationId xmlns:a16="http://schemas.microsoft.com/office/drawing/2014/main" id="{9279B823-E10D-4FA5-A8B5-8E156EC9D0C5}"/>
+              </a:ext>
+            </a:extLst>
+          </p:cNvPr>
+          <p:cNvSpPr/>
+          <p:nvPr/>
+        </p:nvSpPr>
+        <p:spPr>
+          <a:xfrm>
+            <a:off x="2063690" y="3452069"/>
             <a:ext cx="402671" cy="360727"/>
           </a:xfrm>
           <a:prstGeom prst="ellipse">
@@ -8199,266 +10259,6 @@
             <a:pPr algn="ctr"/>
             <a:r>
               <a:rPr lang="pl-PL"/>
-              <a:t>5</a:t>
-            </a:r>
-          </a:p>
-        </p:txBody>
-      </p:sp>
-      <p:sp>
-        <p:nvSpPr>
-          <p:cNvPr id="15" name="Prostokąt 14">
-            <a:extLst>
-              <a:ext uri="{FF2B5EF4-FFF2-40B4-BE49-F238E27FC236}">
-                <a16:creationId xmlns:a16="http://schemas.microsoft.com/office/drawing/2014/main" id="{FEE4E2BC-F7A5-4030-9F0B-357AC8DB550D}"/>
-              </a:ext>
-            </a:extLst>
-          </p:cNvPr>
-          <p:cNvSpPr/>
-          <p:nvPr/>
-        </p:nvSpPr>
-        <p:spPr>
-          <a:xfrm>
-            <a:off x="3205990" y="2034249"/>
-            <a:ext cx="6793687" cy="1992238"/>
-          </a:xfrm>
-          <a:prstGeom prst="rect">
-            <a:avLst/>
-          </a:prstGeom>
-          <a:noFill/>
-          <a:ln w="38100">
-            <a:solidFill>
-              <a:srgbClr val="C00000"/>
-            </a:solidFill>
-          </a:ln>
-        </p:spPr>
-        <p:style>
-          <a:lnRef idx="2">
-            <a:schemeClr val="accent1">
-              <a:shade val="50000"/>
-            </a:schemeClr>
-          </a:lnRef>
-          <a:fillRef idx="1">
-            <a:schemeClr val="accent1"/>
-          </a:fillRef>
-          <a:effectRef idx="0">
-            <a:schemeClr val="accent1"/>
-          </a:effectRef>
-          <a:fontRef idx="minor">
-            <a:schemeClr val="lt1"/>
-          </a:fontRef>
-        </p:style>
-        <p:txBody>
-          <a:bodyPr rtlCol="0" anchor="ctr"/>
-          <a:lstStyle/>
-          <a:p>
-            <a:pPr algn="ctr"/>
-            <a:endParaRPr lang="pl-PL"/>
-          </a:p>
-        </p:txBody>
-      </p:sp>
-      <p:sp>
-        <p:nvSpPr>
-          <p:cNvPr id="16" name="Prostokąt 15">
-            <a:extLst>
-              <a:ext uri="{FF2B5EF4-FFF2-40B4-BE49-F238E27FC236}">
-                <a16:creationId xmlns:a16="http://schemas.microsoft.com/office/drawing/2014/main" id="{4E515B4F-462C-40B4-881F-DB9110614D34}"/>
-              </a:ext>
-            </a:extLst>
-          </p:cNvPr>
-          <p:cNvSpPr/>
-          <p:nvPr/>
-        </p:nvSpPr>
-        <p:spPr>
-          <a:xfrm>
-            <a:off x="3407325" y="4026486"/>
-            <a:ext cx="6315515" cy="1400115"/>
-          </a:xfrm>
-          <a:prstGeom prst="rect">
-            <a:avLst/>
-          </a:prstGeom>
-          <a:noFill/>
-          <a:ln w="38100">
-            <a:solidFill>
-              <a:srgbClr val="C00000"/>
-            </a:solidFill>
-          </a:ln>
-        </p:spPr>
-        <p:style>
-          <a:lnRef idx="2">
-            <a:schemeClr val="accent1">
-              <a:shade val="50000"/>
-            </a:schemeClr>
-          </a:lnRef>
-          <a:fillRef idx="1">
-            <a:schemeClr val="accent1"/>
-          </a:fillRef>
-          <a:effectRef idx="0">
-            <a:schemeClr val="accent1"/>
-          </a:effectRef>
-          <a:fontRef idx="minor">
-            <a:schemeClr val="lt1"/>
-          </a:fontRef>
-        </p:style>
-        <p:txBody>
-          <a:bodyPr rtlCol="0" anchor="ctr"/>
-          <a:lstStyle/>
-          <a:p>
-            <a:pPr algn="ctr"/>
-            <a:endParaRPr lang="pl-PL"/>
-          </a:p>
-        </p:txBody>
-      </p:sp>
-      <p:sp>
-        <p:nvSpPr>
-          <p:cNvPr id="14" name="Owal 13">
-            <a:extLst>
-              <a:ext uri="{FF2B5EF4-FFF2-40B4-BE49-F238E27FC236}">
-                <a16:creationId xmlns:a16="http://schemas.microsoft.com/office/drawing/2014/main" id="{59E216A4-7A2E-46B5-90C3-8A16B46CF662}"/>
-              </a:ext>
-            </a:extLst>
-          </p:cNvPr>
-          <p:cNvSpPr/>
-          <p:nvPr/>
-        </p:nvSpPr>
-        <p:spPr>
-          <a:xfrm>
-            <a:off x="3474438" y="4052192"/>
-            <a:ext cx="402671" cy="360727"/>
-          </a:xfrm>
-          <a:prstGeom prst="ellipse">
-            <a:avLst/>
-          </a:prstGeom>
-          <a:solidFill>
-            <a:srgbClr val="C00000"/>
-          </a:solidFill>
-        </p:spPr>
-        <p:style>
-          <a:lnRef idx="2">
-            <a:schemeClr val="accent2">
-              <a:shade val="50000"/>
-            </a:schemeClr>
-          </a:lnRef>
-          <a:fillRef idx="1">
-            <a:schemeClr val="accent2"/>
-          </a:fillRef>
-          <a:effectRef idx="0">
-            <a:schemeClr val="accent2"/>
-          </a:effectRef>
-          <a:fontRef idx="minor">
-            <a:schemeClr val="lt1"/>
-          </a:fontRef>
-        </p:style>
-        <p:txBody>
-          <a:bodyPr rtlCol="0" anchor="ctr"/>
-          <a:lstStyle/>
-          <a:p>
-            <a:pPr algn="ctr"/>
-            <a:r>
-              <a:rPr lang="pl-PL"/>
-              <a:t>6</a:t>
-            </a:r>
-          </a:p>
-        </p:txBody>
-      </p:sp>
-      <p:sp>
-        <p:nvSpPr>
-          <p:cNvPr id="17" name="Prostokąt 16">
-            <a:extLst>
-              <a:ext uri="{FF2B5EF4-FFF2-40B4-BE49-F238E27FC236}">
-                <a16:creationId xmlns:a16="http://schemas.microsoft.com/office/drawing/2014/main" id="{1300A9F9-1CB4-4F1F-A185-7F2165B4361C}"/>
-              </a:ext>
-            </a:extLst>
-          </p:cNvPr>
-          <p:cNvSpPr/>
-          <p:nvPr/>
-        </p:nvSpPr>
-        <p:spPr>
-          <a:xfrm>
-            <a:off x="2125208" y="1546140"/>
-            <a:ext cx="8293919" cy="4292597"/>
-          </a:xfrm>
-          <a:prstGeom prst="rect">
-            <a:avLst/>
-          </a:prstGeom>
-          <a:noFill/>
-          <a:ln w="38100">
-            <a:solidFill>
-              <a:srgbClr val="C00000"/>
-            </a:solidFill>
-          </a:ln>
-        </p:spPr>
-        <p:style>
-          <a:lnRef idx="2">
-            <a:schemeClr val="accent1">
-              <a:shade val="50000"/>
-            </a:schemeClr>
-          </a:lnRef>
-          <a:fillRef idx="1">
-            <a:schemeClr val="accent1"/>
-          </a:fillRef>
-          <a:effectRef idx="0">
-            <a:schemeClr val="accent1"/>
-          </a:effectRef>
-          <a:fontRef idx="minor">
-            <a:schemeClr val="lt1"/>
-          </a:fontRef>
-        </p:style>
-        <p:txBody>
-          <a:bodyPr rtlCol="0" anchor="ctr"/>
-          <a:lstStyle/>
-          <a:p>
-            <a:pPr algn="ctr"/>
-            <a:endParaRPr lang="pl-PL"/>
-          </a:p>
-        </p:txBody>
-      </p:sp>
-      <p:sp>
-        <p:nvSpPr>
-          <p:cNvPr id="12" name="Owal 11">
-            <a:extLst>
-              <a:ext uri="{FF2B5EF4-FFF2-40B4-BE49-F238E27FC236}">
-                <a16:creationId xmlns:a16="http://schemas.microsoft.com/office/drawing/2014/main" id="{D608EC4F-3B04-4AE3-A547-F27CEF9F2B70}"/>
-              </a:ext>
-            </a:extLst>
-          </p:cNvPr>
-          <p:cNvSpPr/>
-          <p:nvPr/>
-        </p:nvSpPr>
-        <p:spPr>
-          <a:xfrm>
-            <a:off x="2125208" y="1364892"/>
-            <a:ext cx="402671" cy="360727"/>
-          </a:xfrm>
-          <a:prstGeom prst="ellipse">
-            <a:avLst/>
-          </a:prstGeom>
-          <a:solidFill>
-            <a:srgbClr val="C00000"/>
-          </a:solidFill>
-        </p:spPr>
-        <p:style>
-          <a:lnRef idx="2">
-            <a:schemeClr val="accent2">
-              <a:shade val="50000"/>
-            </a:schemeClr>
-          </a:lnRef>
-          <a:fillRef idx="1">
-            <a:schemeClr val="accent2"/>
-          </a:fillRef>
-          <a:effectRef idx="0">
-            <a:schemeClr val="accent2"/>
-          </a:effectRef>
-          <a:fontRef idx="minor">
-            <a:schemeClr val="lt1"/>
-          </a:fontRef>
-        </p:style>
-        <p:txBody>
-          <a:bodyPr rtlCol="0" anchor="ctr"/>
-          <a:lstStyle/>
-          <a:p>
-            <a:pPr algn="ctr"/>
-            <a:r>
-              <a:rPr lang="pl-PL"/>
               <a:t>4</a:t>
             </a:r>
           </a:p>
@@ -8467,7 +10267,7 @@
     </p:spTree>
     <p:extLst>
       <p:ext uri="{BB962C8B-B14F-4D97-AF65-F5344CB8AC3E}">
-        <p14:creationId xmlns:p14="http://schemas.microsoft.com/office/powerpoint/2010/main" val="3809811575"/>
+        <p14:creationId xmlns:p14="http://schemas.microsoft.com/office/powerpoint/2010/main" val="1242660478"/>
       </p:ext>
     </p:extLst>
   </p:cSld>
@@ -8499,7 +10299,7 @@
           <p:cNvPr id="4" name="Obraz 3">
             <a:extLst>
               <a:ext uri="{FF2B5EF4-FFF2-40B4-BE49-F238E27FC236}">
-                <a16:creationId xmlns:a16="http://schemas.microsoft.com/office/drawing/2014/main" id="{E721BC4A-F3DE-43F2-B8F3-1F36CF1762D8}"/>
+                <a16:creationId xmlns:a16="http://schemas.microsoft.com/office/drawing/2014/main" id="{9C370A7C-5151-4973-A7F4-10EF0B8D3AA2}"/>
               </a:ext>
             </a:extLst>
           </p:cNvPr>
@@ -8516,8 +10316,8 @@
         </p:blipFill>
         <p:spPr>
           <a:xfrm>
-            <a:off x="0" y="361419"/>
-            <a:ext cx="12192000" cy="6135203"/>
+            <a:off x="0" y="382622"/>
+            <a:ext cx="12192000" cy="6092756"/>
           </a:xfrm>
           <a:prstGeom prst="rect">
             <a:avLst/>
@@ -8850,7 +10650,7 @@
         </p:nvSpPr>
         <p:spPr>
           <a:xfrm>
-            <a:off x="4452454" y="775280"/>
+            <a:off x="2063690" y="3477236"/>
             <a:ext cx="402671" cy="360727"/>
           </a:xfrm>
           <a:prstGeom prst="ellipse">
@@ -8888,426 +10688,10 @@
           </a:p>
         </p:txBody>
       </p:sp>
-      <p:sp>
-        <p:nvSpPr>
-          <p:cNvPr id="13" name="Prostokąt 12">
-            <a:extLst>
-              <a:ext uri="{FF2B5EF4-FFF2-40B4-BE49-F238E27FC236}">
-                <a16:creationId xmlns:a16="http://schemas.microsoft.com/office/drawing/2014/main" id="{99AD6B7C-45DA-4658-A1B9-D8315DE4CDCE}"/>
-              </a:ext>
-            </a:extLst>
-          </p:cNvPr>
-          <p:cNvSpPr/>
-          <p:nvPr/>
-        </p:nvSpPr>
-        <p:spPr>
-          <a:xfrm>
-            <a:off x="-1" y="361419"/>
-            <a:ext cx="12192001" cy="3648519"/>
-          </a:xfrm>
-          <a:prstGeom prst="rect">
-            <a:avLst/>
-          </a:prstGeom>
-          <a:noFill/>
-          <a:ln w="38100">
-            <a:solidFill>
-              <a:srgbClr val="C00000"/>
-            </a:solidFill>
-          </a:ln>
-        </p:spPr>
-        <p:style>
-          <a:lnRef idx="2">
-            <a:schemeClr val="accent1">
-              <a:shade val="50000"/>
-            </a:schemeClr>
-          </a:lnRef>
-          <a:fillRef idx="1">
-            <a:schemeClr val="accent1"/>
-          </a:fillRef>
-          <a:effectRef idx="0">
-            <a:schemeClr val="accent1"/>
-          </a:effectRef>
-          <a:fontRef idx="minor">
-            <a:schemeClr val="lt1"/>
-          </a:fontRef>
-        </p:style>
-        <p:txBody>
-          <a:bodyPr rtlCol="0" anchor="ctr"/>
-          <a:lstStyle/>
-          <a:p>
-            <a:pPr algn="ctr"/>
-            <a:endParaRPr lang="pl-PL"/>
-          </a:p>
-        </p:txBody>
-      </p:sp>
-      <p:sp>
-        <p:nvSpPr>
-          <p:cNvPr id="16" name="Owal 15">
-            <a:extLst>
-              <a:ext uri="{FF2B5EF4-FFF2-40B4-BE49-F238E27FC236}">
-                <a16:creationId xmlns:a16="http://schemas.microsoft.com/office/drawing/2014/main" id="{078ED556-A047-4BF7-B661-A597A30A1199}"/>
-              </a:ext>
-            </a:extLst>
-          </p:cNvPr>
-          <p:cNvSpPr/>
-          <p:nvPr/>
-        </p:nvSpPr>
-        <p:spPr>
-          <a:xfrm>
-            <a:off x="10322650" y="545284"/>
-            <a:ext cx="402671" cy="360727"/>
-          </a:xfrm>
-          <a:prstGeom prst="ellipse">
-            <a:avLst/>
-          </a:prstGeom>
-          <a:solidFill>
-            <a:srgbClr val="C00000"/>
-          </a:solidFill>
-        </p:spPr>
-        <p:style>
-          <a:lnRef idx="2">
-            <a:schemeClr val="accent2">
-              <a:shade val="50000"/>
-            </a:schemeClr>
-          </a:lnRef>
-          <a:fillRef idx="1">
-            <a:schemeClr val="accent2"/>
-          </a:fillRef>
-          <a:effectRef idx="0">
-            <a:schemeClr val="accent2"/>
-          </a:effectRef>
-          <a:fontRef idx="minor">
-            <a:schemeClr val="lt1"/>
-          </a:fontRef>
-        </p:style>
-        <p:txBody>
-          <a:bodyPr rtlCol="0" anchor="ctr"/>
-          <a:lstStyle/>
-          <a:p>
-            <a:pPr algn="ctr"/>
-            <a:r>
-              <a:rPr lang="pl-PL"/>
-              <a:t>7</a:t>
-            </a:r>
-          </a:p>
-        </p:txBody>
-      </p:sp>
-      <p:sp>
-        <p:nvSpPr>
-          <p:cNvPr id="17" name="Prostokąt 16">
-            <a:extLst>
-              <a:ext uri="{FF2B5EF4-FFF2-40B4-BE49-F238E27FC236}">
-                <a16:creationId xmlns:a16="http://schemas.microsoft.com/office/drawing/2014/main" id="{2A4BAB5F-3595-49F8-8E5A-4CCA66695EFD}"/>
-              </a:ext>
-            </a:extLst>
-          </p:cNvPr>
-          <p:cNvSpPr/>
-          <p:nvPr/>
-        </p:nvSpPr>
-        <p:spPr>
-          <a:xfrm>
-            <a:off x="4676859" y="1078331"/>
-            <a:ext cx="4601365" cy="360727"/>
-          </a:xfrm>
-          <a:prstGeom prst="rect">
-            <a:avLst/>
-          </a:prstGeom>
-          <a:noFill/>
-          <a:ln w="38100">
-            <a:solidFill>
-              <a:srgbClr val="C00000"/>
-            </a:solidFill>
-          </a:ln>
-        </p:spPr>
-        <p:style>
-          <a:lnRef idx="2">
-            <a:schemeClr val="accent1">
-              <a:shade val="50000"/>
-            </a:schemeClr>
-          </a:lnRef>
-          <a:fillRef idx="1">
-            <a:schemeClr val="accent1"/>
-          </a:fillRef>
-          <a:effectRef idx="0">
-            <a:schemeClr val="accent1"/>
-          </a:effectRef>
-          <a:fontRef idx="minor">
-            <a:schemeClr val="lt1"/>
-          </a:fontRef>
-        </p:style>
-        <p:txBody>
-          <a:bodyPr rtlCol="0" anchor="ctr"/>
-          <a:lstStyle/>
-          <a:p>
-            <a:pPr algn="ctr"/>
-            <a:endParaRPr lang="pl-PL"/>
-          </a:p>
-        </p:txBody>
-      </p:sp>
-      <p:sp>
-        <p:nvSpPr>
-          <p:cNvPr id="18" name="Prostokąt 17">
-            <a:extLst>
-              <a:ext uri="{FF2B5EF4-FFF2-40B4-BE49-F238E27FC236}">
-                <a16:creationId xmlns:a16="http://schemas.microsoft.com/office/drawing/2014/main" id="{ADE7A393-36FF-49CA-8216-F560AF991C23}"/>
-              </a:ext>
-            </a:extLst>
-          </p:cNvPr>
-          <p:cNvSpPr/>
-          <p:nvPr/>
-        </p:nvSpPr>
-        <p:spPr>
-          <a:xfrm>
-            <a:off x="4676859" y="1875987"/>
-            <a:ext cx="4601365" cy="959492"/>
-          </a:xfrm>
-          <a:prstGeom prst="rect">
-            <a:avLst/>
-          </a:prstGeom>
-          <a:noFill/>
-          <a:ln w="38100">
-            <a:solidFill>
-              <a:srgbClr val="C00000"/>
-            </a:solidFill>
-          </a:ln>
-        </p:spPr>
-        <p:style>
-          <a:lnRef idx="2">
-            <a:schemeClr val="accent1">
-              <a:shade val="50000"/>
-            </a:schemeClr>
-          </a:lnRef>
-          <a:fillRef idx="1">
-            <a:schemeClr val="accent1"/>
-          </a:fillRef>
-          <a:effectRef idx="0">
-            <a:schemeClr val="accent1"/>
-          </a:effectRef>
-          <a:fontRef idx="minor">
-            <a:schemeClr val="lt1"/>
-          </a:fontRef>
-        </p:style>
-        <p:txBody>
-          <a:bodyPr rtlCol="0" anchor="ctr"/>
-          <a:lstStyle/>
-          <a:p>
-            <a:pPr algn="ctr"/>
-            <a:endParaRPr lang="pl-PL"/>
-          </a:p>
-        </p:txBody>
-      </p:sp>
-      <p:sp>
-        <p:nvSpPr>
-          <p:cNvPr id="19" name="Prostokąt 18">
-            <a:extLst>
-              <a:ext uri="{FF2B5EF4-FFF2-40B4-BE49-F238E27FC236}">
-                <a16:creationId xmlns:a16="http://schemas.microsoft.com/office/drawing/2014/main" id="{2553C09D-F4F4-4344-850D-1126FADC38C0}"/>
-              </a:ext>
-            </a:extLst>
-          </p:cNvPr>
-          <p:cNvSpPr/>
-          <p:nvPr/>
-        </p:nvSpPr>
-        <p:spPr>
-          <a:xfrm>
-            <a:off x="4676859" y="2958166"/>
-            <a:ext cx="1419141" cy="360727"/>
-          </a:xfrm>
-          <a:prstGeom prst="rect">
-            <a:avLst/>
-          </a:prstGeom>
-          <a:noFill/>
-          <a:ln w="38100">
-            <a:solidFill>
-              <a:srgbClr val="C00000"/>
-            </a:solidFill>
-          </a:ln>
-        </p:spPr>
-        <p:style>
-          <a:lnRef idx="2">
-            <a:schemeClr val="accent1">
-              <a:shade val="50000"/>
-            </a:schemeClr>
-          </a:lnRef>
-          <a:fillRef idx="1">
-            <a:schemeClr val="accent1"/>
-          </a:fillRef>
-          <a:effectRef idx="0">
-            <a:schemeClr val="accent1"/>
-          </a:effectRef>
-          <a:fontRef idx="minor">
-            <a:schemeClr val="lt1"/>
-          </a:fontRef>
-        </p:style>
-        <p:txBody>
-          <a:bodyPr rtlCol="0" anchor="ctr"/>
-          <a:lstStyle/>
-          <a:p>
-            <a:pPr algn="ctr"/>
-            <a:endParaRPr lang="pl-PL"/>
-          </a:p>
-        </p:txBody>
-      </p:sp>
-      <p:sp>
-        <p:nvSpPr>
-          <p:cNvPr id="14" name="Owal 13">
-            <a:extLst>
-              <a:ext uri="{FF2B5EF4-FFF2-40B4-BE49-F238E27FC236}">
-                <a16:creationId xmlns:a16="http://schemas.microsoft.com/office/drawing/2014/main" id="{C0659EC7-B116-4D0B-B473-A76E24D0CA69}"/>
-              </a:ext>
-            </a:extLst>
-          </p:cNvPr>
-          <p:cNvSpPr/>
-          <p:nvPr/>
-        </p:nvSpPr>
-        <p:spPr>
-          <a:xfrm>
-            <a:off x="4462942" y="1580969"/>
-            <a:ext cx="402671" cy="360727"/>
-          </a:xfrm>
-          <a:prstGeom prst="ellipse">
-            <a:avLst/>
-          </a:prstGeom>
-          <a:solidFill>
-            <a:srgbClr val="C00000"/>
-          </a:solidFill>
-        </p:spPr>
-        <p:style>
-          <a:lnRef idx="2">
-            <a:schemeClr val="accent2">
-              <a:shade val="50000"/>
-            </a:schemeClr>
-          </a:lnRef>
-          <a:fillRef idx="1">
-            <a:schemeClr val="accent2"/>
-          </a:fillRef>
-          <a:effectRef idx="0">
-            <a:schemeClr val="accent2"/>
-          </a:effectRef>
-          <a:fontRef idx="minor">
-            <a:schemeClr val="lt1"/>
-          </a:fontRef>
-        </p:style>
-        <p:txBody>
-          <a:bodyPr rtlCol="0" anchor="ctr"/>
-          <a:lstStyle/>
-          <a:p>
-            <a:pPr algn="ctr"/>
-            <a:r>
-              <a:rPr lang="pl-PL"/>
-              <a:t>5</a:t>
-            </a:r>
-          </a:p>
-        </p:txBody>
-      </p:sp>
-      <p:sp>
-        <p:nvSpPr>
-          <p:cNvPr id="15" name="Owal 14">
-            <a:extLst>
-              <a:ext uri="{FF2B5EF4-FFF2-40B4-BE49-F238E27FC236}">
-                <a16:creationId xmlns:a16="http://schemas.microsoft.com/office/drawing/2014/main" id="{C985A0CB-847D-4F1F-9BE6-D39F83926123}"/>
-              </a:ext>
-            </a:extLst>
-          </p:cNvPr>
-          <p:cNvSpPr/>
-          <p:nvPr/>
-        </p:nvSpPr>
-        <p:spPr>
-          <a:xfrm>
-            <a:off x="4452453" y="2716459"/>
-            <a:ext cx="402671" cy="360727"/>
-          </a:xfrm>
-          <a:prstGeom prst="ellipse">
-            <a:avLst/>
-          </a:prstGeom>
-          <a:solidFill>
-            <a:srgbClr val="C00000"/>
-          </a:solidFill>
-        </p:spPr>
-        <p:style>
-          <a:lnRef idx="2">
-            <a:schemeClr val="accent2">
-              <a:shade val="50000"/>
-            </a:schemeClr>
-          </a:lnRef>
-          <a:fillRef idx="1">
-            <a:schemeClr val="accent2"/>
-          </a:fillRef>
-          <a:effectRef idx="0">
-            <a:schemeClr val="accent2"/>
-          </a:effectRef>
-          <a:fontRef idx="minor">
-            <a:schemeClr val="lt1"/>
-          </a:fontRef>
-        </p:style>
-        <p:txBody>
-          <a:bodyPr rtlCol="0" anchor="ctr"/>
-          <a:lstStyle/>
-          <a:p>
-            <a:pPr algn="ctr"/>
-            <a:r>
-              <a:rPr lang="pl-PL"/>
-              <a:t>6</a:t>
-            </a:r>
-          </a:p>
-        </p:txBody>
-      </p:sp>
-      <p:sp>
-        <p:nvSpPr>
-          <p:cNvPr id="20" name="Prostokąt 19">
-            <a:extLst>
-              <a:ext uri="{FF2B5EF4-FFF2-40B4-BE49-F238E27FC236}">
-                <a16:creationId xmlns:a16="http://schemas.microsoft.com/office/drawing/2014/main" id="{870EA9D1-DAB9-4FD9-A588-562015EC9DD8}"/>
-              </a:ext>
-            </a:extLst>
-          </p:cNvPr>
-          <p:cNvSpPr/>
-          <p:nvPr/>
-        </p:nvSpPr>
-        <p:spPr>
-          <a:xfrm>
-            <a:off x="10577119" y="752379"/>
-            <a:ext cx="1360412" cy="959492"/>
-          </a:xfrm>
-          <a:prstGeom prst="rect">
-            <a:avLst/>
-          </a:prstGeom>
-          <a:noFill/>
-          <a:ln w="38100">
-            <a:solidFill>
-              <a:srgbClr val="C00000"/>
-            </a:solidFill>
-          </a:ln>
-        </p:spPr>
-        <p:style>
-          <a:lnRef idx="2">
-            <a:schemeClr val="accent1">
-              <a:shade val="50000"/>
-            </a:schemeClr>
-          </a:lnRef>
-          <a:fillRef idx="1">
-            <a:schemeClr val="accent1"/>
-          </a:fillRef>
-          <a:effectRef idx="0">
-            <a:schemeClr val="accent1"/>
-          </a:effectRef>
-          <a:fontRef idx="minor">
-            <a:schemeClr val="lt1"/>
-          </a:fontRef>
-        </p:style>
-        <p:txBody>
-          <a:bodyPr rtlCol="0" anchor="ctr"/>
-          <a:lstStyle/>
-          <a:p>
-            <a:pPr algn="ctr"/>
-            <a:endParaRPr lang="pl-PL"/>
-          </a:p>
-        </p:txBody>
-      </p:sp>
     </p:spTree>
     <p:extLst>
       <p:ext uri="{BB962C8B-B14F-4D97-AF65-F5344CB8AC3E}">
-        <p14:creationId xmlns:p14="http://schemas.microsoft.com/office/powerpoint/2010/main" val="2296116465"/>
+        <p14:creationId xmlns:p14="http://schemas.microsoft.com/office/powerpoint/2010/main" val="2124321504"/>
       </p:ext>
     </p:extLst>
   </p:cSld>

</xml_diff>